<commit_message>
edit ppt and simulation
</commit_message>
<xml_diff>
--- a/Localization of Transmitter using TDOA analysis.pptx
+++ b/Localization of Transmitter using TDOA analysis.pptx
@@ -2,13 +2,15 @@
 <file path=ppt/presentation.xml><?xml version="1.0" encoding="utf-8"?>
 <p:presentation xmlns:a="http://schemas.openxmlformats.org/drawingml/2006/main" xmlns:r="http://schemas.openxmlformats.org/officeDocument/2006/relationships" xmlns:p="http://schemas.openxmlformats.org/presentationml/2006/main" saveSubsetFonts="1">
   <p:sldMasterIdLst>
-    <p:sldMasterId id="2147483660" r:id="rId1"/>
+    <p:sldMasterId id="2147483707" r:id="rId1"/>
   </p:sldMasterIdLst>
   <p:sldIdLst>
     <p:sldId id="256" r:id="rId2"/>
     <p:sldId id="258" r:id="rId3"/>
     <p:sldId id="259" r:id="rId4"/>
     <p:sldId id="260" r:id="rId5"/>
+    <p:sldId id="261" r:id="rId6"/>
+    <p:sldId id="262" r:id="rId7"/>
   </p:sldIdLst>
   <p:sldSz cx="12192000" cy="6858000"/>
   <p:notesSz cx="6858000" cy="9144000"/>
@@ -444,7 +446,7 @@
     </p:spTree>
     <p:extLst>
       <p:ext uri="{BB962C8B-B14F-4D97-AF65-F5344CB8AC3E}">
-        <p14:creationId xmlns:p14="http://schemas.microsoft.com/office/powerpoint/2010/main" val="1412966603"/>
+        <p14:creationId xmlns:p14="http://schemas.microsoft.com/office/powerpoint/2010/main" val="4223702738"/>
       </p:ext>
     </p:extLst>
   </p:cSld>
@@ -614,7 +616,7 @@
     </p:spTree>
     <p:extLst>
       <p:ext uri="{BB962C8B-B14F-4D97-AF65-F5344CB8AC3E}">
-        <p14:creationId xmlns:p14="http://schemas.microsoft.com/office/powerpoint/2010/main" val="558377744"/>
+        <p14:creationId xmlns:p14="http://schemas.microsoft.com/office/powerpoint/2010/main" val="1632927545"/>
       </p:ext>
     </p:extLst>
   </p:cSld>
@@ -870,7 +872,7 @@
     </p:spTree>
     <p:extLst>
       <p:ext uri="{BB962C8B-B14F-4D97-AF65-F5344CB8AC3E}">
-        <p14:creationId xmlns:p14="http://schemas.microsoft.com/office/powerpoint/2010/main" val="2073843490"/>
+        <p14:creationId xmlns:p14="http://schemas.microsoft.com/office/powerpoint/2010/main" val="2034884491"/>
       </p:ext>
     </p:extLst>
   </p:cSld>
@@ -1044,7 +1046,7 @@
     </p:spTree>
     <p:extLst>
       <p:ext uri="{BB962C8B-B14F-4D97-AF65-F5344CB8AC3E}">
-        <p14:creationId xmlns:p14="http://schemas.microsoft.com/office/powerpoint/2010/main" val="1147570341"/>
+        <p14:creationId xmlns:p14="http://schemas.microsoft.com/office/powerpoint/2010/main" val="3269188232"/>
       </p:ext>
     </p:extLst>
   </p:cSld>
@@ -1425,7 +1427,7 @@
     </p:spTree>
     <p:extLst>
       <p:ext uri="{BB962C8B-B14F-4D97-AF65-F5344CB8AC3E}">
-        <p14:creationId xmlns:p14="http://schemas.microsoft.com/office/powerpoint/2010/main" val="237161164"/>
+        <p14:creationId xmlns:p14="http://schemas.microsoft.com/office/powerpoint/2010/main" val="2811918077"/>
       </p:ext>
     </p:extLst>
   </p:cSld>
@@ -1662,7 +1664,7 @@
     </p:spTree>
     <p:extLst>
       <p:ext uri="{BB962C8B-B14F-4D97-AF65-F5344CB8AC3E}">
-        <p14:creationId xmlns:p14="http://schemas.microsoft.com/office/powerpoint/2010/main" val="1274224300"/>
+        <p14:creationId xmlns:p14="http://schemas.microsoft.com/office/powerpoint/2010/main" val="2306724306"/>
       </p:ext>
     </p:extLst>
   </p:cSld>
@@ -2041,7 +2043,7 @@
     </p:spTree>
     <p:extLst>
       <p:ext uri="{BB962C8B-B14F-4D97-AF65-F5344CB8AC3E}">
-        <p14:creationId xmlns:p14="http://schemas.microsoft.com/office/powerpoint/2010/main" val="1390764115"/>
+        <p14:creationId xmlns:p14="http://schemas.microsoft.com/office/powerpoint/2010/main" val="2766408470"/>
       </p:ext>
     </p:extLst>
   </p:cSld>
@@ -2159,7 +2161,7 @@
     </p:spTree>
     <p:extLst>
       <p:ext uri="{BB962C8B-B14F-4D97-AF65-F5344CB8AC3E}">
-        <p14:creationId xmlns:p14="http://schemas.microsoft.com/office/powerpoint/2010/main" val="1449240861"/>
+        <p14:creationId xmlns:p14="http://schemas.microsoft.com/office/powerpoint/2010/main" val="493714289"/>
       </p:ext>
     </p:extLst>
   </p:cSld>
@@ -2352,7 +2354,7 @@
     </p:spTree>
     <p:extLst>
       <p:ext uri="{BB962C8B-B14F-4D97-AF65-F5344CB8AC3E}">
-        <p14:creationId xmlns:p14="http://schemas.microsoft.com/office/powerpoint/2010/main" val="445474661"/>
+        <p14:creationId xmlns:p14="http://schemas.microsoft.com/office/powerpoint/2010/main" val="1578730714"/>
       </p:ext>
     </p:extLst>
   </p:cSld>
@@ -2719,7 +2721,7 @@
     </p:spTree>
     <p:extLst>
       <p:ext uri="{BB962C8B-B14F-4D97-AF65-F5344CB8AC3E}">
-        <p14:creationId xmlns:p14="http://schemas.microsoft.com/office/powerpoint/2010/main" val="1447797199"/>
+        <p14:creationId xmlns:p14="http://schemas.microsoft.com/office/powerpoint/2010/main" val="2070820570"/>
       </p:ext>
     </p:extLst>
   </p:cSld>
@@ -3080,7 +3082,7 @@
     </p:spTree>
     <p:extLst>
       <p:ext uri="{BB962C8B-B14F-4D97-AF65-F5344CB8AC3E}">
-        <p14:creationId xmlns:p14="http://schemas.microsoft.com/office/powerpoint/2010/main" val="2727818405"/>
+        <p14:creationId xmlns:p14="http://schemas.microsoft.com/office/powerpoint/2010/main" val="619274027"/>
       </p:ext>
     </p:extLst>
   </p:cSld>
@@ -3451,23 +3453,23 @@
     </p:spTree>
     <p:extLst>
       <p:ext uri="{BB962C8B-B14F-4D97-AF65-F5344CB8AC3E}">
-        <p14:creationId xmlns:p14="http://schemas.microsoft.com/office/powerpoint/2010/main" val="4069190302"/>
+        <p14:creationId xmlns:p14="http://schemas.microsoft.com/office/powerpoint/2010/main" val="3337852601"/>
       </p:ext>
     </p:extLst>
   </p:cSld>
   <p:clrMap bg1="lt1" tx1="dk1" bg2="lt2" tx2="dk2" accent1="accent1" accent2="accent2" accent3="accent3" accent4="accent4" accent5="accent5" accent6="accent6" hlink="hlink" folHlink="folHlink"/>
   <p:sldLayoutIdLst>
-    <p:sldLayoutId id="2147483661" r:id="rId1"/>
-    <p:sldLayoutId id="2147483662" r:id="rId2"/>
-    <p:sldLayoutId id="2147483663" r:id="rId3"/>
-    <p:sldLayoutId id="2147483664" r:id="rId4"/>
-    <p:sldLayoutId id="2147483665" r:id="rId5"/>
-    <p:sldLayoutId id="2147483666" r:id="rId6"/>
-    <p:sldLayoutId id="2147483667" r:id="rId7"/>
-    <p:sldLayoutId id="2147483668" r:id="rId8"/>
-    <p:sldLayoutId id="2147483669" r:id="rId9"/>
-    <p:sldLayoutId id="2147483670" r:id="rId10"/>
-    <p:sldLayoutId id="2147483671" r:id="rId11"/>
+    <p:sldLayoutId id="2147483708" r:id="rId1"/>
+    <p:sldLayoutId id="2147483709" r:id="rId2"/>
+    <p:sldLayoutId id="2147483710" r:id="rId3"/>
+    <p:sldLayoutId id="2147483711" r:id="rId4"/>
+    <p:sldLayoutId id="2147483712" r:id="rId5"/>
+    <p:sldLayoutId id="2147483713" r:id="rId6"/>
+    <p:sldLayoutId id="2147483714" r:id="rId7"/>
+    <p:sldLayoutId id="2147483715" r:id="rId8"/>
+    <p:sldLayoutId id="2147483716" r:id="rId9"/>
+    <p:sldLayoutId id="2147483717" r:id="rId10"/>
+    <p:sldLayoutId id="2147483718" r:id="rId11"/>
   </p:sldLayoutIdLst>
   <p:txStyles>
     <p:titleStyle>
@@ -3872,7 +3874,7 @@
         </p:nvSpPr>
         <p:spPr>
           <a:xfrm>
-            <a:off x="1066800" y="1682825"/>
+            <a:off x="1161144" y="1647616"/>
             <a:ext cx="10058400" cy="1608346"/>
           </a:xfrm>
         </p:spPr>
@@ -3915,15 +3917,28 @@
           <a:bodyPr/>
           <a:lstStyle/>
           <a:p>
-            <a:r>
-              <a:rPr lang="en-IN" dirty="0"/>
+            <a:pPr algn="ctr"/>
+            <a:r>
+              <a:rPr lang="en-IN" dirty="0">
+                <a:solidFill>
+                  <a:schemeClr val="tx1"/>
+                </a:solidFill>
+              </a:rPr>
               <a:t>Supervisor – Prof. Seshan </a:t>
             </a:r>
             <a:r>
-              <a:rPr lang="en-IN" dirty="0" err="1"/>
+              <a:rPr lang="en-IN" dirty="0" err="1">
+                <a:solidFill>
+                  <a:schemeClr val="tx1"/>
+                </a:solidFill>
+              </a:rPr>
               <a:t>Srirangarajan</a:t>
             </a:r>
-            <a:endParaRPr lang="en-IN" dirty="0"/>
+            <a:endParaRPr lang="en-IN" dirty="0">
+              <a:solidFill>
+                <a:schemeClr val="tx1"/>
+              </a:solidFill>
+            </a:endParaRPr>
           </a:p>
         </p:txBody>
       </p:sp>
@@ -3941,8 +3956,8 @@
         </p:nvSpPr>
         <p:spPr>
           <a:xfrm>
-            <a:off x="3587959" y="4470637"/>
-            <a:ext cx="5016082" cy="923330"/>
+            <a:off x="3442817" y="4470637"/>
+            <a:ext cx="5016082" cy="646331"/>
           </a:xfrm>
           <a:prstGeom prst="rect">
             <a:avLst/>
@@ -3957,22 +3972,29 @@
           <a:p>
             <a:pPr algn="ctr"/>
             <a:r>
-              <a:rPr lang="en-IN" dirty="0"/>
+              <a:rPr lang="en-IN" dirty="0">
+                <a:solidFill>
+                  <a:schemeClr val="tx1">
+                    <a:lumMod val="50000"/>
+                    <a:lumOff val="50000"/>
+                  </a:schemeClr>
+                </a:solidFill>
+              </a:rPr>
               <a:t>By -</a:t>
             </a:r>
           </a:p>
           <a:p>
             <a:pPr algn="ctr"/>
             <a:r>
-              <a:rPr lang="en-IN" dirty="0"/>
-              <a:t>Divyansh Kumar</a:t>
-            </a:r>
-          </a:p>
-          <a:p>
-            <a:pPr algn="ctr"/>
-            <a:r>
-              <a:rPr lang="en-IN" dirty="0"/>
-              <a:t>Gopal Saha</a:t>
+              <a:rPr lang="en-IN" dirty="0">
+                <a:solidFill>
+                  <a:schemeClr val="tx1">
+                    <a:lumMod val="50000"/>
+                    <a:lumOff val="50000"/>
+                  </a:schemeClr>
+                </a:solidFill>
+              </a:rPr>
+              <a:t>Divyansh Kumar and Gopal Saha</a:t>
             </a:r>
           </a:p>
         </p:txBody>
@@ -4539,7 +4561,7 @@
         <p:spPr>
           <a:xfrm>
             <a:off x="260456" y="688497"/>
-            <a:ext cx="10830394" cy="400110"/>
+            <a:ext cx="10830394" cy="369332"/>
           </a:xfrm>
           <a:prstGeom prst="rect">
             <a:avLst/>
@@ -4553,19 +4575,19 @@
           <a:lstStyle/>
           <a:p>
             <a:r>
-              <a:rPr lang="en-IN" sz="2000" dirty="0"/>
+              <a:rPr lang="en-IN" dirty="0"/>
               <a:t>TDOA stands for </a:t>
             </a:r>
             <a:r>
-              <a:rPr lang="en-IN" sz="2000" b="1" dirty="0"/>
+              <a:rPr lang="en-IN" b="1" dirty="0"/>
               <a:t>Time difference of Arrival. </a:t>
             </a:r>
             <a:r>
-              <a:rPr lang="en-IN" sz="2000" dirty="0"/>
+              <a:rPr lang="en-IN" dirty="0"/>
               <a:t>Its one of the methods to pinpoint transmitter location</a:t>
             </a:r>
             <a:r>
-              <a:rPr lang="en-IN" sz="2000" b="1" dirty="0"/>
+              <a:rPr lang="en-IN" b="1" dirty="0"/>
               <a:t> </a:t>
             </a:r>
           </a:p>
@@ -4585,7 +4607,7 @@
         </p:nvSpPr>
         <p:spPr>
           <a:xfrm>
-            <a:off x="260456" y="1089038"/>
+            <a:off x="251085" y="1136518"/>
             <a:ext cx="10830394" cy="369332"/>
           </a:xfrm>
           <a:prstGeom prst="rect">
@@ -4634,8 +4656,8 @@
             </p:nvSpPr>
             <p:spPr>
               <a:xfrm>
-                <a:off x="260456" y="1458370"/>
-                <a:ext cx="11581774" cy="1086901"/>
+                <a:off x="260456" y="1536628"/>
+                <a:ext cx="11931544" cy="1037913"/>
               </a:xfrm>
               <a:prstGeom prst="rect">
                 <a:avLst/>
@@ -4656,22 +4678,22 @@
                   <a:rPr lang="en-IN" i="1" u="sng" dirty="0"/>
                 </a:br>
                 <a:r>
-                  <a:rPr lang="en-IN" dirty="0"/>
-                  <a:t>Lets Take 3 Receivers forming a triangle and 1 transmitter in 2D plane. Coordinates of R1,R2,R3 are (0,0) , (a,0), (</a:t>
+                  <a:rPr lang="en-IN" sz="1600" dirty="0"/>
+                  <a:t>Lets Take 3 Receivers forming a triangle and 1 transmitter in 2D plane. Coordinates of R1,R2,R3 are (0,0), (a,0), (</a:t>
                 </a:r>
                 <a14:m>
                   <m:oMath xmlns:m="http://schemas.openxmlformats.org/officeDocument/2006/math">
                     <m:f>
                       <m:fPr>
                         <m:ctrlPr>
-                          <a:rPr lang="en-IN" b="0" i="1" smtClean="0">
+                          <a:rPr lang="en-IN" sz="1600" b="0" i="1" smtClean="0">
                             <a:latin typeface="Cambria Math" panose="02040503050406030204" pitchFamily="18" charset="0"/>
                           </a:rPr>
                         </m:ctrlPr>
                       </m:fPr>
                       <m:num>
                         <m:r>
-                          <a:rPr lang="en-IN" b="0" i="1" smtClean="0">
+                          <a:rPr lang="en-IN" sz="1600" b="0" i="1" smtClean="0">
                             <a:latin typeface="Cambria Math" panose="02040503050406030204" pitchFamily="18" charset="0"/>
                           </a:rPr>
                           <m:t>𝑎</m:t>
@@ -4679,7 +4701,7 @@
                       </m:num>
                       <m:den>
                         <m:r>
-                          <a:rPr lang="en-IN" b="0" i="1" smtClean="0">
+                          <a:rPr lang="en-IN" sz="1600" b="0" i="1" smtClean="0">
                             <a:latin typeface="Cambria Math" panose="02040503050406030204" pitchFamily="18" charset="0"/>
                           </a:rPr>
                           <m:t>2</m:t>
@@ -4687,19 +4709,19 @@
                       </m:den>
                     </m:f>
                     <m:r>
-                      <a:rPr lang="en-IN" b="0" i="1" smtClean="0">
+                      <a:rPr lang="en-IN" sz="1600" b="0" i="1" smtClean="0">
                         <a:latin typeface="Cambria Math" panose="02040503050406030204" pitchFamily="18" charset="0"/>
                       </a:rPr>
                       <m:t>,</m:t>
                     </m:r>
                     <m:r>
-                      <a:rPr lang="en-IN" b="0" i="1" smtClean="0">
+                      <a:rPr lang="en-IN" sz="1600" b="0" i="1" smtClean="0">
                         <a:latin typeface="Cambria Math" panose="02040503050406030204" pitchFamily="18" charset="0"/>
                       </a:rPr>
                       <m:t>𝑎</m:t>
                     </m:r>
                     <m:r>
-                      <a:rPr lang="en-IN" b="0" i="1" smtClean="0">
+                      <a:rPr lang="en-IN" sz="1600" b="0" i="1" smtClean="0">
                         <a:latin typeface="Cambria Math" panose="02040503050406030204" pitchFamily="18" charset="0"/>
                       </a:rPr>
                       <m:t>.</m:t>
@@ -4707,7 +4729,7 @@
                     <m:f>
                       <m:fPr>
                         <m:ctrlPr>
-                          <a:rPr lang="en-IN" b="0" i="1" smtClean="0">
+                          <a:rPr lang="en-IN" sz="1600" b="0" i="1" smtClean="0">
                             <a:latin typeface="Cambria Math" panose="02040503050406030204" pitchFamily="18" charset="0"/>
                           </a:rPr>
                         </m:ctrlPr>
@@ -4717,7 +4739,7 @@
                           <m:radPr>
                             <m:degHide m:val="on"/>
                             <m:ctrlPr>
-                              <a:rPr lang="en-IN" b="0" i="1" smtClean="0">
+                              <a:rPr lang="en-IN" sz="1600" b="0" i="1" smtClean="0">
                                 <a:latin typeface="Cambria Math" panose="02040503050406030204" pitchFamily="18" charset="0"/>
                               </a:rPr>
                             </m:ctrlPr>
@@ -4725,7 +4747,7 @@
                           <m:deg/>
                           <m:e>
                             <m:r>
-                              <a:rPr lang="en-IN" b="0" i="1" smtClean="0">
+                              <a:rPr lang="en-IN" sz="1600" b="0" i="1" smtClean="0">
                                 <a:latin typeface="Cambria Math" panose="02040503050406030204" pitchFamily="18" charset="0"/>
                               </a:rPr>
                               <m:t>3</m:t>
@@ -4735,7 +4757,7 @@
                       </m:num>
                       <m:den>
                         <m:r>
-                          <a:rPr lang="en-IN" b="0" i="1" smtClean="0">
+                          <a:rPr lang="en-IN" sz="1600" b="0" i="1" smtClean="0">
                             <a:latin typeface="Cambria Math" panose="02040503050406030204" pitchFamily="18" charset="0"/>
                           </a:rPr>
                           <m:t>2</m:t>
@@ -4743,14 +4765,14 @@
                       </m:den>
                     </m:f>
                     <m:r>
-                      <a:rPr lang="en-IN" b="0" i="1" smtClean="0">
+                      <a:rPr lang="en-IN" sz="1600" b="0" i="1" smtClean="0">
                         <a:latin typeface="Cambria Math" panose="02040503050406030204" pitchFamily="18" charset="0"/>
                       </a:rPr>
                       <m:t>)</m:t>
                     </m:r>
                   </m:oMath>
                 </a14:m>
-                <a:endParaRPr lang="en-IN" dirty="0"/>
+                <a:endParaRPr lang="en-IN" sz="1600" dirty="0"/>
               </a:p>
               <a:p>
                 <a:endParaRPr lang="en-IN" dirty="0"/>
@@ -4775,8 +4797,8 @@
             </p:nvSpPr>
             <p:spPr>
               <a:xfrm>
-                <a:off x="260456" y="1458370"/>
-                <a:ext cx="11581774" cy="1086901"/>
+                <a:off x="260456" y="1536628"/>
+                <a:ext cx="11931544" cy="1037913"/>
               </a:xfrm>
               <a:prstGeom prst="rect">
                 <a:avLst/>
@@ -4784,7 +4806,7 @@
               <a:blipFill>
                 <a:blip r:embed="rId2"/>
                 <a:stretch>
-                  <a:fillRect l="-474" t="-2793"/>
+                  <a:fillRect l="-460" t="-2941"/>
                 </a:stretch>
               </a:blipFill>
             </p:spPr>
@@ -4832,7 +4854,7 @@
         </p:blipFill>
         <p:spPr>
           <a:xfrm>
-            <a:off x="701416" y="2281823"/>
+            <a:off x="530747" y="2653427"/>
             <a:ext cx="4964866" cy="4062246"/>
           </a:xfrm>
           <a:prstGeom prst="rect">
@@ -4856,7 +4878,7 @@
             </p:nvSpPr>
             <p:spPr>
               <a:xfrm>
-                <a:off x="5908936" y="2545271"/>
+                <a:off x="5765904" y="2523499"/>
                 <a:ext cx="6165640" cy="3719288"/>
               </a:xfrm>
               <a:prstGeom prst="rect">
@@ -4885,6 +4907,7 @@
                 </a:endParaRPr>
               </a:p>
               <a:p>
+                <a:pPr/>
                 <a14:m>
                   <m:oMathPara xmlns:m="http://schemas.openxmlformats.org/officeDocument/2006/math">
                     <m:oMathParaPr>
@@ -4895,7 +4918,9 @@
                         <m:radPr>
                           <m:degHide m:val="on"/>
                           <m:ctrlPr>
-                            <a:rPr lang="ar-AE" sz="1600"/>
+                            <a:rPr lang="ar-AE" sz="1600" i="1">
+                              <a:latin typeface="Cambria Math" panose="02040503050406030204" pitchFamily="18" charset="0"/>
+                            </a:rPr>
                           </m:ctrlPr>
                         </m:radPr>
                         <m:deg/>
@@ -4904,33 +4929,45 @@
                             <m:dPr>
                               <m:endChr m:val=""/>
                               <m:ctrlPr>
-                                <a:rPr lang="ar-AE" sz="1600"/>
+                                <a:rPr lang="ar-AE" sz="1600" i="1">
+                                  <a:latin typeface="Cambria Math" panose="02040503050406030204" pitchFamily="18" charset="0"/>
+                                </a:rPr>
                               </m:ctrlPr>
                             </m:dPr>
                             <m:e>
                               <m:r>
-                                <a:rPr lang="ar-AE" sz="1600" i="1"/>
+                                <a:rPr lang="ar-AE" sz="1600" i="1">
+                                  <a:latin typeface="Cambria Math" panose="02040503050406030204" pitchFamily="18" charset="0"/>
+                                </a:rPr>
                                 <m:t>𝑥</m:t>
                               </m:r>
                               <m:r>
-                                <a:rPr lang="ar-AE" sz="1600"/>
+                                <a:rPr lang="ar-AE" sz="1600">
+                                  <a:latin typeface="Cambria Math" panose="02040503050406030204" pitchFamily="18" charset="0"/>
+                                </a:rPr>
                                 <m:t>−</m:t>
                               </m:r>
                               <m:sSub>
                                 <m:sSubPr>
                                   <m:ctrlPr>
-                                    <a:rPr lang="ar-AE" sz="1600" i="1"/>
+                                    <a:rPr lang="ar-AE" sz="1600" i="1">
+                                      <a:latin typeface="Cambria Math" panose="02040503050406030204" pitchFamily="18" charset="0"/>
+                                    </a:rPr>
                                   </m:ctrlPr>
                                 </m:sSubPr>
                                 <m:e>
                                   <m:r>
-                                    <a:rPr lang="ar-AE" sz="1600" i="1"/>
+                                    <a:rPr lang="ar-AE" sz="1600" i="1">
+                                      <a:latin typeface="Cambria Math" panose="02040503050406030204" pitchFamily="18" charset="0"/>
+                                    </a:rPr>
                                     <m:t>𝑥</m:t>
                                   </m:r>
                                 </m:e>
                                 <m:sub>
                                   <m:r>
-                                    <a:rPr lang="ar-AE" sz="1600"/>
+                                    <a:rPr lang="ar-AE" sz="1600">
+                                      <a:latin typeface="Cambria Math" panose="02040503050406030204" pitchFamily="18" charset="0"/>
+                                    </a:rPr>
                                     <m:t>1</m:t>
                                   </m:r>
                                 </m:sub>
@@ -4938,7 +4975,9 @@
                               <m:sSup>
                                 <m:sSupPr>
                                   <m:ctrlPr>
-                                    <a:rPr lang="ar-AE" sz="1600" i="1"/>
+                                    <a:rPr lang="ar-AE" sz="1600" i="1">
+                                      <a:latin typeface="Cambria Math" panose="02040503050406030204" pitchFamily="18" charset="0"/>
+                                    </a:rPr>
                                   </m:ctrlPr>
                                 </m:sSupPr>
                                 <m:e>
@@ -4947,12 +4986,16 @@
                                       <m:begChr m:val=""/>
                                       <m:endChr m:val=""/>
                                       <m:ctrlPr>
-                                        <a:rPr lang="ar-AE" sz="1600" i="1"/>
+                                        <a:rPr lang="ar-AE" sz="1600" i="1">
+                                          <a:latin typeface="Cambria Math" panose="02040503050406030204" pitchFamily="18" charset="0"/>
+                                        </a:rPr>
                                       </m:ctrlPr>
                                     </m:dPr>
                                     <m:e>
                                       <m:r>
-                                        <a:rPr lang="ar-AE" sz="1600"/>
+                                        <a:rPr lang="ar-AE" sz="1600">
+                                          <a:latin typeface="Cambria Math" panose="02040503050406030204" pitchFamily="18" charset="0"/>
+                                        </a:rPr>
                                         <m:t>)</m:t>
                                       </m:r>
                                     </m:e>
@@ -4960,46 +5003,62 @@
                                 </m:e>
                                 <m:sup>
                                   <m:r>
-                                    <a:rPr lang="ar-AE" sz="1600"/>
+                                    <a:rPr lang="ar-AE" sz="1600">
+                                      <a:latin typeface="Cambria Math" panose="02040503050406030204" pitchFamily="18" charset="0"/>
+                                    </a:rPr>
                                     <m:t>2</m:t>
                                   </m:r>
                                 </m:sup>
                               </m:sSup>
                               <m:r>
-                                <a:rPr lang="ar-AE" sz="1600"/>
+                                <a:rPr lang="ar-AE" sz="1600">
+                                  <a:latin typeface="Cambria Math" panose="02040503050406030204" pitchFamily="18" charset="0"/>
+                                </a:rPr>
                                 <m:t>+</m:t>
                               </m:r>
                               <m:d>
                                 <m:dPr>
                                   <m:endChr m:val=""/>
                                   <m:ctrlPr>
-                                    <a:rPr lang="ar-AE" sz="1600" i="1"/>
+                                    <a:rPr lang="ar-AE" sz="1600" i="1">
+                                      <a:latin typeface="Cambria Math" panose="02040503050406030204" pitchFamily="18" charset="0"/>
+                                    </a:rPr>
                                   </m:ctrlPr>
                                 </m:dPr>
                                 <m:e>
                                   <m:r>
-                                    <a:rPr lang="ar-AE" sz="1600" i="1"/>
+                                    <a:rPr lang="ar-AE" sz="1600" i="1">
+                                      <a:latin typeface="Cambria Math" panose="02040503050406030204" pitchFamily="18" charset="0"/>
+                                    </a:rPr>
                                     <m:t>𝑦</m:t>
                                   </m:r>
                                   <m:r>
-                                    <a:rPr lang="ar-AE" sz="1600"/>
+                                    <a:rPr lang="ar-AE" sz="1600">
+                                      <a:latin typeface="Cambria Math" panose="02040503050406030204" pitchFamily="18" charset="0"/>
+                                    </a:rPr>
                                     <m:t>−</m:t>
                                   </m:r>
                                   <m:sSub>
                                     <m:sSubPr>
                                       <m:ctrlPr>
-                                        <a:rPr lang="ar-AE" sz="1600" i="1"/>
+                                        <a:rPr lang="ar-AE" sz="1600" i="1">
+                                          <a:latin typeface="Cambria Math" panose="02040503050406030204" pitchFamily="18" charset="0"/>
+                                        </a:rPr>
                                       </m:ctrlPr>
                                     </m:sSubPr>
                                     <m:e>
                                       <m:r>
-                                        <a:rPr lang="ar-AE" sz="1600" i="1"/>
+                                        <a:rPr lang="ar-AE" sz="1600" i="1">
+                                          <a:latin typeface="Cambria Math" panose="02040503050406030204" pitchFamily="18" charset="0"/>
+                                        </a:rPr>
                                         <m:t>𝑦</m:t>
                                       </m:r>
                                     </m:e>
                                     <m:sub>
                                       <m:r>
-                                        <a:rPr lang="ar-AE" sz="1600"/>
+                                        <a:rPr lang="ar-AE" sz="1600">
+                                          <a:latin typeface="Cambria Math" panose="02040503050406030204" pitchFamily="18" charset="0"/>
+                                        </a:rPr>
                                         <m:t>1</m:t>
                                       </m:r>
                                     </m:sub>
@@ -5007,7 +5066,9 @@
                                   <m:sSup>
                                     <m:sSupPr>
                                       <m:ctrlPr>
-                                        <a:rPr lang="ar-AE" sz="1600" i="1"/>
+                                        <a:rPr lang="ar-AE" sz="1600" i="1">
+                                          <a:latin typeface="Cambria Math" panose="02040503050406030204" pitchFamily="18" charset="0"/>
+                                        </a:rPr>
                                       </m:ctrlPr>
                                     </m:sSupPr>
                                     <m:e>
@@ -5016,12 +5077,16 @@
                                           <m:begChr m:val=""/>
                                           <m:endChr m:val=""/>
                                           <m:ctrlPr>
-                                            <a:rPr lang="ar-AE" sz="1600" i="1"/>
+                                            <a:rPr lang="ar-AE" sz="1600" i="1">
+                                              <a:latin typeface="Cambria Math" panose="02040503050406030204" pitchFamily="18" charset="0"/>
+                                            </a:rPr>
                                           </m:ctrlPr>
                                         </m:dPr>
                                         <m:e>
                                           <m:r>
-                                            <a:rPr lang="ar-AE" sz="1600"/>
+                                            <a:rPr lang="ar-AE" sz="1600">
+                                              <a:latin typeface="Cambria Math" panose="02040503050406030204" pitchFamily="18" charset="0"/>
+                                            </a:rPr>
                                             <m:t>)</m:t>
                                           </m:r>
                                         </m:e>
@@ -5029,7 +5094,9 @@
                                     </m:e>
                                     <m:sup>
                                       <m:r>
-                                        <a:rPr lang="ar-AE" sz="1600"/>
+                                        <a:rPr lang="ar-AE" sz="1600">
+                                          <a:latin typeface="Cambria Math" panose="02040503050406030204" pitchFamily="18" charset="0"/>
+                                        </a:rPr>
                                         <m:t>2</m:t>
                                       </m:r>
                                     </m:sup>
@@ -5041,14 +5108,18 @@
                         </m:e>
                       </m:rad>
                       <m:r>
-                        <a:rPr lang="ar-AE" sz="1600"/>
+                        <a:rPr lang="ar-AE" sz="1600">
+                          <a:latin typeface="Cambria Math" panose="02040503050406030204" pitchFamily="18" charset="0"/>
+                        </a:rPr>
                         <m:t>−</m:t>
                       </m:r>
                       <m:rad>
                         <m:radPr>
                           <m:degHide m:val="on"/>
                           <m:ctrlPr>
-                            <a:rPr lang="ar-AE" sz="1600" i="1"/>
+                            <a:rPr lang="ar-AE" sz="1600" i="1">
+                              <a:latin typeface="Cambria Math" panose="02040503050406030204" pitchFamily="18" charset="0"/>
+                            </a:rPr>
                           </m:ctrlPr>
                         </m:radPr>
                         <m:deg/>
@@ -5057,33 +5128,45 @@
                             <m:dPr>
                               <m:endChr m:val=""/>
                               <m:ctrlPr>
-                                <a:rPr lang="ar-AE" sz="1600" i="1"/>
+                                <a:rPr lang="ar-AE" sz="1600" i="1">
+                                  <a:latin typeface="Cambria Math" panose="02040503050406030204" pitchFamily="18" charset="0"/>
+                                </a:rPr>
                               </m:ctrlPr>
                             </m:dPr>
                             <m:e>
                               <m:r>
-                                <a:rPr lang="ar-AE" sz="1600" i="1"/>
+                                <a:rPr lang="ar-AE" sz="1600" i="1">
+                                  <a:latin typeface="Cambria Math" panose="02040503050406030204" pitchFamily="18" charset="0"/>
+                                </a:rPr>
                                 <m:t>𝑥</m:t>
                               </m:r>
                               <m:r>
-                                <a:rPr lang="ar-AE" sz="1600"/>
+                                <a:rPr lang="ar-AE" sz="1600">
+                                  <a:latin typeface="Cambria Math" panose="02040503050406030204" pitchFamily="18" charset="0"/>
+                                </a:rPr>
                                 <m:t>−</m:t>
                               </m:r>
                               <m:sSub>
                                 <m:sSubPr>
                                   <m:ctrlPr>
-                                    <a:rPr lang="ar-AE" sz="1600" i="1"/>
+                                    <a:rPr lang="ar-AE" sz="1600" i="1">
+                                      <a:latin typeface="Cambria Math" panose="02040503050406030204" pitchFamily="18" charset="0"/>
+                                    </a:rPr>
                                   </m:ctrlPr>
                                 </m:sSubPr>
                                 <m:e>
                                   <m:r>
-                                    <a:rPr lang="ar-AE" sz="1600" i="1"/>
+                                    <a:rPr lang="ar-AE" sz="1600" i="1">
+                                      <a:latin typeface="Cambria Math" panose="02040503050406030204" pitchFamily="18" charset="0"/>
+                                    </a:rPr>
                                     <m:t>𝑥</m:t>
                                   </m:r>
                                 </m:e>
                                 <m:sub>
                                   <m:r>
-                                    <a:rPr lang="ar-AE" sz="1600"/>
+                                    <a:rPr lang="ar-AE" sz="1600">
+                                      <a:latin typeface="Cambria Math" panose="02040503050406030204" pitchFamily="18" charset="0"/>
+                                    </a:rPr>
                                     <m:t>2</m:t>
                                   </m:r>
                                 </m:sub>
@@ -5091,7 +5174,9 @@
                               <m:sSup>
                                 <m:sSupPr>
                                   <m:ctrlPr>
-                                    <a:rPr lang="ar-AE" sz="1600" i="1"/>
+                                    <a:rPr lang="ar-AE" sz="1600" i="1">
+                                      <a:latin typeface="Cambria Math" panose="02040503050406030204" pitchFamily="18" charset="0"/>
+                                    </a:rPr>
                                   </m:ctrlPr>
                                 </m:sSupPr>
                                 <m:e>
@@ -5100,12 +5185,16 @@
                                       <m:begChr m:val=""/>
                                       <m:endChr m:val=""/>
                                       <m:ctrlPr>
-                                        <a:rPr lang="ar-AE" sz="1600" i="1"/>
+                                        <a:rPr lang="ar-AE" sz="1600" i="1">
+                                          <a:latin typeface="Cambria Math" panose="02040503050406030204" pitchFamily="18" charset="0"/>
+                                        </a:rPr>
                                       </m:ctrlPr>
                                     </m:dPr>
                                     <m:e>
                                       <m:r>
-                                        <a:rPr lang="ar-AE" sz="1600"/>
+                                        <a:rPr lang="ar-AE" sz="1600">
+                                          <a:latin typeface="Cambria Math" panose="02040503050406030204" pitchFamily="18" charset="0"/>
+                                        </a:rPr>
                                         <m:t>)</m:t>
                                       </m:r>
                                     </m:e>
@@ -5113,46 +5202,62 @@
                                 </m:e>
                                 <m:sup>
                                   <m:r>
-                                    <a:rPr lang="ar-AE" sz="1600"/>
+                                    <a:rPr lang="ar-AE" sz="1600">
+                                      <a:latin typeface="Cambria Math" panose="02040503050406030204" pitchFamily="18" charset="0"/>
+                                    </a:rPr>
                                     <m:t>2</m:t>
                                   </m:r>
                                 </m:sup>
                               </m:sSup>
                               <m:r>
-                                <a:rPr lang="ar-AE" sz="1600"/>
+                                <a:rPr lang="ar-AE" sz="1600">
+                                  <a:latin typeface="Cambria Math" panose="02040503050406030204" pitchFamily="18" charset="0"/>
+                                </a:rPr>
                                 <m:t>+</m:t>
                               </m:r>
                               <m:d>
                                 <m:dPr>
                                   <m:endChr m:val=""/>
                                   <m:ctrlPr>
-                                    <a:rPr lang="ar-AE" sz="1600" i="1"/>
+                                    <a:rPr lang="ar-AE" sz="1600" i="1">
+                                      <a:latin typeface="Cambria Math" panose="02040503050406030204" pitchFamily="18" charset="0"/>
+                                    </a:rPr>
                                   </m:ctrlPr>
                                 </m:dPr>
                                 <m:e>
                                   <m:r>
-                                    <a:rPr lang="ar-AE" sz="1600" i="1"/>
+                                    <a:rPr lang="ar-AE" sz="1600" i="1">
+                                      <a:latin typeface="Cambria Math" panose="02040503050406030204" pitchFamily="18" charset="0"/>
+                                    </a:rPr>
                                     <m:t>𝑦</m:t>
                                   </m:r>
                                   <m:r>
-                                    <a:rPr lang="ar-AE" sz="1600"/>
+                                    <a:rPr lang="ar-AE" sz="1600">
+                                      <a:latin typeface="Cambria Math" panose="02040503050406030204" pitchFamily="18" charset="0"/>
+                                    </a:rPr>
                                     <m:t>−</m:t>
                                   </m:r>
                                   <m:sSub>
                                     <m:sSubPr>
                                       <m:ctrlPr>
-                                        <a:rPr lang="ar-AE" sz="1600" i="1"/>
+                                        <a:rPr lang="ar-AE" sz="1600" i="1">
+                                          <a:latin typeface="Cambria Math" panose="02040503050406030204" pitchFamily="18" charset="0"/>
+                                        </a:rPr>
                                       </m:ctrlPr>
                                     </m:sSubPr>
                                     <m:e>
                                       <m:r>
-                                        <a:rPr lang="ar-AE" sz="1600" i="1"/>
+                                        <a:rPr lang="ar-AE" sz="1600" i="1">
+                                          <a:latin typeface="Cambria Math" panose="02040503050406030204" pitchFamily="18" charset="0"/>
+                                        </a:rPr>
                                         <m:t>𝑦</m:t>
                                       </m:r>
                                     </m:e>
                                     <m:sub>
                                       <m:r>
-                                        <a:rPr lang="ar-AE" sz="1600"/>
+                                        <a:rPr lang="ar-AE" sz="1600">
+                                          <a:latin typeface="Cambria Math" panose="02040503050406030204" pitchFamily="18" charset="0"/>
+                                        </a:rPr>
                                         <m:t>2</m:t>
                                       </m:r>
                                     </m:sub>
@@ -5160,7 +5265,9 @@
                                   <m:sSup>
                                     <m:sSupPr>
                                       <m:ctrlPr>
-                                        <a:rPr lang="ar-AE" sz="1600" i="1"/>
+                                        <a:rPr lang="ar-AE" sz="1600" i="1">
+                                          <a:latin typeface="Cambria Math" panose="02040503050406030204" pitchFamily="18" charset="0"/>
+                                        </a:rPr>
                                       </m:ctrlPr>
                                     </m:sSupPr>
                                     <m:e>
@@ -5169,12 +5276,16 @@
                                           <m:begChr m:val=""/>
                                           <m:endChr m:val=""/>
                                           <m:ctrlPr>
-                                            <a:rPr lang="ar-AE" sz="1600" i="1"/>
+                                            <a:rPr lang="ar-AE" sz="1600" i="1">
+                                              <a:latin typeface="Cambria Math" panose="02040503050406030204" pitchFamily="18" charset="0"/>
+                                            </a:rPr>
                                           </m:ctrlPr>
                                         </m:dPr>
                                         <m:e>
                                           <m:r>
-                                            <a:rPr lang="ar-AE" sz="1600"/>
+                                            <a:rPr lang="ar-AE" sz="1600">
+                                              <a:latin typeface="Cambria Math" panose="02040503050406030204" pitchFamily="18" charset="0"/>
+                                            </a:rPr>
                                             <m:t>)</m:t>
                                           </m:r>
                                         </m:e>
@@ -5182,7 +5293,9 @@
                                     </m:e>
                                     <m:sup>
                                       <m:r>
-                                        <a:rPr lang="ar-AE" sz="1600"/>
+                                        <a:rPr lang="ar-AE" sz="1600">
+                                          <a:latin typeface="Cambria Math" panose="02040503050406030204" pitchFamily="18" charset="0"/>
+                                        </a:rPr>
                                         <m:t>2</m:t>
                                       </m:r>
                                     </m:sup>
@@ -5194,24 +5307,32 @@
                         </m:e>
                       </m:rad>
                       <m:r>
-                        <a:rPr lang="ar-AE" sz="1600"/>
+                        <a:rPr lang="ar-AE" sz="1600">
+                          <a:latin typeface="Cambria Math" panose="02040503050406030204" pitchFamily="18" charset="0"/>
+                        </a:rPr>
                         <m:t>=</m:t>
                       </m:r>
                       <m:sSub>
                         <m:sSubPr>
                           <m:ctrlPr>
-                            <a:rPr lang="ar-AE" sz="1600" i="1"/>
+                            <a:rPr lang="ar-AE" sz="1600" i="1">
+                              <a:latin typeface="Cambria Math" panose="02040503050406030204" pitchFamily="18" charset="0"/>
+                            </a:rPr>
                           </m:ctrlPr>
                         </m:sSubPr>
                         <m:e>
                           <m:r>
-                            <a:rPr lang="ar-AE" sz="1600" i="1"/>
+                            <a:rPr lang="ar-AE" sz="1600" i="1">
+                              <a:latin typeface="Cambria Math" panose="02040503050406030204" pitchFamily="18" charset="0"/>
+                            </a:rPr>
                             <m:t>𝑑</m:t>
                           </m:r>
                         </m:e>
                         <m:sub>
                           <m:r>
-                            <a:rPr lang="ar-AE" sz="1600"/>
+                            <a:rPr lang="ar-AE" sz="1600">
+                              <a:latin typeface="Cambria Math" panose="02040503050406030204" pitchFamily="18" charset="0"/>
+                            </a:rPr>
                             <m:t>12</m:t>
                           </m:r>
                         </m:sub>
@@ -5222,6 +5343,7 @@
                 <a:endParaRPr lang="ar-AE" sz="1600" dirty="0"/>
               </a:p>
               <a:p>
+                <a:pPr/>
                 <a14:m>
                   <m:oMathPara xmlns:m="http://schemas.openxmlformats.org/officeDocument/2006/math">
                     <m:oMathParaPr>
@@ -5232,7 +5354,9 @@
                         <m:radPr>
                           <m:degHide m:val="on"/>
                           <m:ctrlPr>
-                            <a:rPr lang="ar-AE" sz="1600"/>
+                            <a:rPr lang="ar-AE" sz="1600" i="1">
+                              <a:latin typeface="Cambria Math" panose="02040503050406030204" pitchFamily="18" charset="0"/>
+                            </a:rPr>
                           </m:ctrlPr>
                         </m:radPr>
                         <m:deg/>
@@ -5241,33 +5365,45 @@
                             <m:dPr>
                               <m:endChr m:val=""/>
                               <m:ctrlPr>
-                                <a:rPr lang="ar-AE" sz="1600"/>
+                                <a:rPr lang="ar-AE" sz="1600" i="1">
+                                  <a:latin typeface="Cambria Math" panose="02040503050406030204" pitchFamily="18" charset="0"/>
+                                </a:rPr>
                               </m:ctrlPr>
                             </m:dPr>
                             <m:e>
                               <m:r>
-                                <a:rPr lang="ar-AE" sz="1600" i="1"/>
+                                <a:rPr lang="ar-AE" sz="1600" i="1">
+                                  <a:latin typeface="Cambria Math" panose="02040503050406030204" pitchFamily="18" charset="0"/>
+                                </a:rPr>
                                 <m:t>𝑥</m:t>
                               </m:r>
                               <m:r>
-                                <a:rPr lang="ar-AE" sz="1600"/>
+                                <a:rPr lang="ar-AE" sz="1600">
+                                  <a:latin typeface="Cambria Math" panose="02040503050406030204" pitchFamily="18" charset="0"/>
+                                </a:rPr>
                                 <m:t>−</m:t>
                               </m:r>
                               <m:sSub>
                                 <m:sSubPr>
                                   <m:ctrlPr>
-                                    <a:rPr lang="ar-AE" sz="1600" i="1"/>
+                                    <a:rPr lang="ar-AE" sz="1600" i="1">
+                                      <a:latin typeface="Cambria Math" panose="02040503050406030204" pitchFamily="18" charset="0"/>
+                                    </a:rPr>
                                   </m:ctrlPr>
                                 </m:sSubPr>
                                 <m:e>
                                   <m:r>
-                                    <a:rPr lang="ar-AE" sz="1600" i="1"/>
+                                    <a:rPr lang="ar-AE" sz="1600" i="1">
+                                      <a:latin typeface="Cambria Math" panose="02040503050406030204" pitchFamily="18" charset="0"/>
+                                    </a:rPr>
                                     <m:t>𝑥</m:t>
                                   </m:r>
                                 </m:e>
                                 <m:sub>
                                   <m:r>
-                                    <a:rPr lang="ar-AE" sz="1600"/>
+                                    <a:rPr lang="ar-AE" sz="1600">
+                                      <a:latin typeface="Cambria Math" panose="02040503050406030204" pitchFamily="18" charset="0"/>
+                                    </a:rPr>
                                     <m:t>2</m:t>
                                   </m:r>
                                 </m:sub>
@@ -5275,7 +5411,9 @@
                               <m:sSup>
                                 <m:sSupPr>
                                   <m:ctrlPr>
-                                    <a:rPr lang="ar-AE" sz="1600" i="1"/>
+                                    <a:rPr lang="ar-AE" sz="1600" i="1">
+                                      <a:latin typeface="Cambria Math" panose="02040503050406030204" pitchFamily="18" charset="0"/>
+                                    </a:rPr>
                                   </m:ctrlPr>
                                 </m:sSupPr>
                                 <m:e>
@@ -5284,12 +5422,16 @@
                                       <m:begChr m:val=""/>
                                       <m:endChr m:val=""/>
                                       <m:ctrlPr>
-                                        <a:rPr lang="ar-AE" sz="1600" i="1"/>
+                                        <a:rPr lang="ar-AE" sz="1600" i="1">
+                                          <a:latin typeface="Cambria Math" panose="02040503050406030204" pitchFamily="18" charset="0"/>
+                                        </a:rPr>
                                       </m:ctrlPr>
                                     </m:dPr>
                                     <m:e>
                                       <m:r>
-                                        <a:rPr lang="ar-AE" sz="1600"/>
+                                        <a:rPr lang="ar-AE" sz="1600">
+                                          <a:latin typeface="Cambria Math" panose="02040503050406030204" pitchFamily="18" charset="0"/>
+                                        </a:rPr>
                                         <m:t>)</m:t>
                                       </m:r>
                                     </m:e>
@@ -5297,46 +5439,62 @@
                                 </m:e>
                                 <m:sup>
                                   <m:r>
-                                    <a:rPr lang="ar-AE" sz="1600"/>
+                                    <a:rPr lang="ar-AE" sz="1600">
+                                      <a:latin typeface="Cambria Math" panose="02040503050406030204" pitchFamily="18" charset="0"/>
+                                    </a:rPr>
                                     <m:t>2</m:t>
                                   </m:r>
                                 </m:sup>
                               </m:sSup>
                               <m:r>
-                                <a:rPr lang="ar-AE" sz="1600"/>
+                                <a:rPr lang="ar-AE" sz="1600">
+                                  <a:latin typeface="Cambria Math" panose="02040503050406030204" pitchFamily="18" charset="0"/>
+                                </a:rPr>
                                 <m:t>+</m:t>
                               </m:r>
                               <m:d>
                                 <m:dPr>
                                   <m:endChr m:val=""/>
                                   <m:ctrlPr>
-                                    <a:rPr lang="ar-AE" sz="1600" i="1"/>
+                                    <a:rPr lang="ar-AE" sz="1600" i="1">
+                                      <a:latin typeface="Cambria Math" panose="02040503050406030204" pitchFamily="18" charset="0"/>
+                                    </a:rPr>
                                   </m:ctrlPr>
                                 </m:dPr>
                                 <m:e>
                                   <m:r>
-                                    <a:rPr lang="ar-AE" sz="1600" i="1"/>
+                                    <a:rPr lang="ar-AE" sz="1600" i="1">
+                                      <a:latin typeface="Cambria Math" panose="02040503050406030204" pitchFamily="18" charset="0"/>
+                                    </a:rPr>
                                     <m:t>𝑦</m:t>
                                   </m:r>
                                   <m:r>
-                                    <a:rPr lang="ar-AE" sz="1600"/>
+                                    <a:rPr lang="ar-AE" sz="1600">
+                                      <a:latin typeface="Cambria Math" panose="02040503050406030204" pitchFamily="18" charset="0"/>
+                                    </a:rPr>
                                     <m:t>−</m:t>
                                   </m:r>
                                   <m:sSub>
                                     <m:sSubPr>
                                       <m:ctrlPr>
-                                        <a:rPr lang="ar-AE" sz="1600" i="1"/>
+                                        <a:rPr lang="ar-AE" sz="1600" i="1">
+                                          <a:latin typeface="Cambria Math" panose="02040503050406030204" pitchFamily="18" charset="0"/>
+                                        </a:rPr>
                                       </m:ctrlPr>
                                     </m:sSubPr>
                                     <m:e>
                                       <m:r>
-                                        <a:rPr lang="ar-AE" sz="1600" i="1"/>
+                                        <a:rPr lang="ar-AE" sz="1600" i="1">
+                                          <a:latin typeface="Cambria Math" panose="02040503050406030204" pitchFamily="18" charset="0"/>
+                                        </a:rPr>
                                         <m:t>𝑦</m:t>
                                       </m:r>
                                     </m:e>
                                     <m:sub>
                                       <m:r>
-                                        <a:rPr lang="ar-AE" sz="1600"/>
+                                        <a:rPr lang="ar-AE" sz="1600">
+                                          <a:latin typeface="Cambria Math" panose="02040503050406030204" pitchFamily="18" charset="0"/>
+                                        </a:rPr>
                                         <m:t>2</m:t>
                                       </m:r>
                                     </m:sub>
@@ -5344,7 +5502,9 @@
                                   <m:sSup>
                                     <m:sSupPr>
                                       <m:ctrlPr>
-                                        <a:rPr lang="ar-AE" sz="1600" i="1"/>
+                                        <a:rPr lang="ar-AE" sz="1600" i="1">
+                                          <a:latin typeface="Cambria Math" panose="02040503050406030204" pitchFamily="18" charset="0"/>
+                                        </a:rPr>
                                       </m:ctrlPr>
                                     </m:sSupPr>
                                     <m:e>
@@ -5353,12 +5513,16 @@
                                           <m:begChr m:val=""/>
                                           <m:endChr m:val=""/>
                                           <m:ctrlPr>
-                                            <a:rPr lang="ar-AE" sz="1600" i="1"/>
+                                            <a:rPr lang="ar-AE" sz="1600" i="1">
+                                              <a:latin typeface="Cambria Math" panose="02040503050406030204" pitchFamily="18" charset="0"/>
+                                            </a:rPr>
                                           </m:ctrlPr>
                                         </m:dPr>
                                         <m:e>
                                           <m:r>
-                                            <a:rPr lang="ar-AE" sz="1600"/>
+                                            <a:rPr lang="ar-AE" sz="1600">
+                                              <a:latin typeface="Cambria Math" panose="02040503050406030204" pitchFamily="18" charset="0"/>
+                                            </a:rPr>
                                             <m:t>)</m:t>
                                           </m:r>
                                         </m:e>
@@ -5366,7 +5530,9 @@
                                     </m:e>
                                     <m:sup>
                                       <m:r>
-                                        <a:rPr lang="ar-AE" sz="1600"/>
+                                        <a:rPr lang="ar-AE" sz="1600">
+                                          <a:latin typeface="Cambria Math" panose="02040503050406030204" pitchFamily="18" charset="0"/>
+                                        </a:rPr>
                                         <m:t>2</m:t>
                                       </m:r>
                                     </m:sup>
@@ -5378,14 +5544,18 @@
                         </m:e>
                       </m:rad>
                       <m:r>
-                        <a:rPr lang="ar-AE" sz="1600"/>
+                        <a:rPr lang="ar-AE" sz="1600">
+                          <a:latin typeface="Cambria Math" panose="02040503050406030204" pitchFamily="18" charset="0"/>
+                        </a:rPr>
                         <m:t>−</m:t>
                       </m:r>
                       <m:rad>
                         <m:radPr>
                           <m:degHide m:val="on"/>
                           <m:ctrlPr>
-                            <a:rPr lang="ar-AE" sz="1600" i="1"/>
+                            <a:rPr lang="ar-AE" sz="1600" i="1">
+                              <a:latin typeface="Cambria Math" panose="02040503050406030204" pitchFamily="18" charset="0"/>
+                            </a:rPr>
                           </m:ctrlPr>
                         </m:radPr>
                         <m:deg/>
@@ -5394,33 +5564,45 @@
                             <m:dPr>
                               <m:endChr m:val=""/>
                               <m:ctrlPr>
-                                <a:rPr lang="ar-AE" sz="1600" i="1"/>
+                                <a:rPr lang="ar-AE" sz="1600" i="1">
+                                  <a:latin typeface="Cambria Math" panose="02040503050406030204" pitchFamily="18" charset="0"/>
+                                </a:rPr>
                               </m:ctrlPr>
                             </m:dPr>
                             <m:e>
                               <m:r>
-                                <a:rPr lang="ar-AE" sz="1600" i="1"/>
+                                <a:rPr lang="ar-AE" sz="1600" i="1">
+                                  <a:latin typeface="Cambria Math" panose="02040503050406030204" pitchFamily="18" charset="0"/>
+                                </a:rPr>
                                 <m:t>𝑥</m:t>
                               </m:r>
                               <m:r>
-                                <a:rPr lang="ar-AE" sz="1600"/>
+                                <a:rPr lang="ar-AE" sz="1600">
+                                  <a:latin typeface="Cambria Math" panose="02040503050406030204" pitchFamily="18" charset="0"/>
+                                </a:rPr>
                                 <m:t>−</m:t>
                               </m:r>
                               <m:sSub>
                                 <m:sSubPr>
                                   <m:ctrlPr>
-                                    <a:rPr lang="ar-AE" sz="1600" i="1"/>
+                                    <a:rPr lang="ar-AE" sz="1600" i="1">
+                                      <a:latin typeface="Cambria Math" panose="02040503050406030204" pitchFamily="18" charset="0"/>
+                                    </a:rPr>
                                   </m:ctrlPr>
                                 </m:sSubPr>
                                 <m:e>
                                   <m:r>
-                                    <a:rPr lang="ar-AE" sz="1600" i="1"/>
+                                    <a:rPr lang="ar-AE" sz="1600" i="1">
+                                      <a:latin typeface="Cambria Math" panose="02040503050406030204" pitchFamily="18" charset="0"/>
+                                    </a:rPr>
                                     <m:t>𝑥</m:t>
                                   </m:r>
                                 </m:e>
                                 <m:sub>
                                   <m:r>
-                                    <a:rPr lang="ar-AE" sz="1600"/>
+                                    <a:rPr lang="ar-AE" sz="1600">
+                                      <a:latin typeface="Cambria Math" panose="02040503050406030204" pitchFamily="18" charset="0"/>
+                                    </a:rPr>
                                     <m:t>3</m:t>
                                   </m:r>
                                 </m:sub>
@@ -5428,7 +5610,9 @@
                               <m:sSup>
                                 <m:sSupPr>
                                   <m:ctrlPr>
-                                    <a:rPr lang="ar-AE" sz="1600" i="1"/>
+                                    <a:rPr lang="ar-AE" sz="1600" i="1">
+                                      <a:latin typeface="Cambria Math" panose="02040503050406030204" pitchFamily="18" charset="0"/>
+                                    </a:rPr>
                                   </m:ctrlPr>
                                 </m:sSupPr>
                                 <m:e>
@@ -5437,12 +5621,16 @@
                                       <m:begChr m:val=""/>
                                       <m:endChr m:val=""/>
                                       <m:ctrlPr>
-                                        <a:rPr lang="ar-AE" sz="1600" i="1"/>
+                                        <a:rPr lang="ar-AE" sz="1600" i="1">
+                                          <a:latin typeface="Cambria Math" panose="02040503050406030204" pitchFamily="18" charset="0"/>
+                                        </a:rPr>
                                       </m:ctrlPr>
                                     </m:dPr>
                                     <m:e>
                                       <m:r>
-                                        <a:rPr lang="ar-AE" sz="1600"/>
+                                        <a:rPr lang="ar-AE" sz="1600">
+                                          <a:latin typeface="Cambria Math" panose="02040503050406030204" pitchFamily="18" charset="0"/>
+                                        </a:rPr>
                                         <m:t>)</m:t>
                                       </m:r>
                                     </m:e>
@@ -5450,46 +5638,62 @@
                                 </m:e>
                                 <m:sup>
                                   <m:r>
-                                    <a:rPr lang="ar-AE" sz="1600"/>
+                                    <a:rPr lang="ar-AE" sz="1600">
+                                      <a:latin typeface="Cambria Math" panose="02040503050406030204" pitchFamily="18" charset="0"/>
+                                    </a:rPr>
                                     <m:t>2</m:t>
                                   </m:r>
                                 </m:sup>
                               </m:sSup>
                               <m:r>
-                                <a:rPr lang="ar-AE" sz="1600"/>
+                                <a:rPr lang="ar-AE" sz="1600">
+                                  <a:latin typeface="Cambria Math" panose="02040503050406030204" pitchFamily="18" charset="0"/>
+                                </a:rPr>
                                 <m:t>+</m:t>
                               </m:r>
                               <m:d>
                                 <m:dPr>
                                   <m:endChr m:val=""/>
                                   <m:ctrlPr>
-                                    <a:rPr lang="ar-AE" sz="1600" i="1"/>
+                                    <a:rPr lang="ar-AE" sz="1600" i="1">
+                                      <a:latin typeface="Cambria Math" panose="02040503050406030204" pitchFamily="18" charset="0"/>
+                                    </a:rPr>
                                   </m:ctrlPr>
                                 </m:dPr>
                                 <m:e>
                                   <m:r>
-                                    <a:rPr lang="ar-AE" sz="1600" i="1"/>
+                                    <a:rPr lang="ar-AE" sz="1600" i="1">
+                                      <a:latin typeface="Cambria Math" panose="02040503050406030204" pitchFamily="18" charset="0"/>
+                                    </a:rPr>
                                     <m:t>𝑦</m:t>
                                   </m:r>
                                   <m:r>
-                                    <a:rPr lang="ar-AE" sz="1600"/>
+                                    <a:rPr lang="ar-AE" sz="1600">
+                                      <a:latin typeface="Cambria Math" panose="02040503050406030204" pitchFamily="18" charset="0"/>
+                                    </a:rPr>
                                     <m:t>−</m:t>
                                   </m:r>
                                   <m:sSub>
                                     <m:sSubPr>
                                       <m:ctrlPr>
-                                        <a:rPr lang="ar-AE" sz="1600" i="1"/>
+                                        <a:rPr lang="ar-AE" sz="1600" i="1">
+                                          <a:latin typeface="Cambria Math" panose="02040503050406030204" pitchFamily="18" charset="0"/>
+                                        </a:rPr>
                                       </m:ctrlPr>
                                     </m:sSubPr>
                                     <m:e>
                                       <m:r>
-                                        <a:rPr lang="ar-AE" sz="1600" i="1"/>
+                                        <a:rPr lang="ar-AE" sz="1600" i="1">
+                                          <a:latin typeface="Cambria Math" panose="02040503050406030204" pitchFamily="18" charset="0"/>
+                                        </a:rPr>
                                         <m:t>𝑦</m:t>
                                       </m:r>
                                     </m:e>
                                     <m:sub>
                                       <m:r>
-                                        <a:rPr lang="ar-AE" sz="1600"/>
+                                        <a:rPr lang="ar-AE" sz="1600">
+                                          <a:latin typeface="Cambria Math" panose="02040503050406030204" pitchFamily="18" charset="0"/>
+                                        </a:rPr>
                                         <m:t>3</m:t>
                                       </m:r>
                                     </m:sub>
@@ -5497,7 +5701,9 @@
                                   <m:sSup>
                                     <m:sSupPr>
                                       <m:ctrlPr>
-                                        <a:rPr lang="ar-AE" sz="1600" i="1"/>
+                                        <a:rPr lang="ar-AE" sz="1600" i="1">
+                                          <a:latin typeface="Cambria Math" panose="02040503050406030204" pitchFamily="18" charset="0"/>
+                                        </a:rPr>
                                       </m:ctrlPr>
                                     </m:sSupPr>
                                     <m:e>
@@ -5506,12 +5712,16 @@
                                           <m:begChr m:val=""/>
                                           <m:endChr m:val=""/>
                                           <m:ctrlPr>
-                                            <a:rPr lang="ar-AE" sz="1600" i="1"/>
+                                            <a:rPr lang="ar-AE" sz="1600" i="1">
+                                              <a:latin typeface="Cambria Math" panose="02040503050406030204" pitchFamily="18" charset="0"/>
+                                            </a:rPr>
                                           </m:ctrlPr>
                                         </m:dPr>
                                         <m:e>
                                           <m:r>
-                                            <a:rPr lang="ar-AE" sz="1600"/>
+                                            <a:rPr lang="ar-AE" sz="1600">
+                                              <a:latin typeface="Cambria Math" panose="02040503050406030204" pitchFamily="18" charset="0"/>
+                                            </a:rPr>
                                             <m:t>)</m:t>
                                           </m:r>
                                         </m:e>
@@ -5519,7 +5729,9 @@
                                     </m:e>
                                     <m:sup>
                                       <m:r>
-                                        <a:rPr lang="ar-AE" sz="1600"/>
+                                        <a:rPr lang="ar-AE" sz="1600">
+                                          <a:latin typeface="Cambria Math" panose="02040503050406030204" pitchFamily="18" charset="0"/>
+                                        </a:rPr>
                                         <m:t>2</m:t>
                                       </m:r>
                                     </m:sup>
@@ -5531,24 +5743,32 @@
                         </m:e>
                       </m:rad>
                       <m:r>
-                        <a:rPr lang="ar-AE" sz="1600"/>
+                        <a:rPr lang="ar-AE" sz="1600">
+                          <a:latin typeface="Cambria Math" panose="02040503050406030204" pitchFamily="18" charset="0"/>
+                        </a:rPr>
                         <m:t>=</m:t>
                       </m:r>
                       <m:sSub>
                         <m:sSubPr>
                           <m:ctrlPr>
-                            <a:rPr lang="ar-AE" sz="1600" i="1"/>
+                            <a:rPr lang="ar-AE" sz="1600" i="1">
+                              <a:latin typeface="Cambria Math" panose="02040503050406030204" pitchFamily="18" charset="0"/>
+                            </a:rPr>
                           </m:ctrlPr>
                         </m:sSubPr>
                         <m:e>
                           <m:r>
-                            <a:rPr lang="ar-AE" sz="1600" i="1"/>
+                            <a:rPr lang="ar-AE" sz="1600" i="1">
+                              <a:latin typeface="Cambria Math" panose="02040503050406030204" pitchFamily="18" charset="0"/>
+                            </a:rPr>
                             <m:t>𝑑</m:t>
                           </m:r>
                         </m:e>
                         <m:sub>
                           <m:r>
-                            <a:rPr lang="ar-AE" sz="1600"/>
+                            <a:rPr lang="ar-AE" sz="1600">
+                              <a:latin typeface="Cambria Math" panose="02040503050406030204" pitchFamily="18" charset="0"/>
+                            </a:rPr>
                             <m:t>23</m:t>
                           </m:r>
                         </m:sub>
@@ -5559,6 +5779,7 @@
                 <a:endParaRPr lang="ar-AE" sz="1600" dirty="0"/>
               </a:p>
               <a:p>
+                <a:pPr/>
                 <a14:m>
                   <m:oMathPara xmlns:m="http://schemas.openxmlformats.org/officeDocument/2006/math">
                     <m:oMathParaPr>
@@ -5569,7 +5790,9 @@
                         <m:radPr>
                           <m:degHide m:val="on"/>
                           <m:ctrlPr>
-                            <a:rPr lang="ar-AE" sz="1600"/>
+                            <a:rPr lang="ar-AE" sz="1600" i="1">
+                              <a:latin typeface="Cambria Math" panose="02040503050406030204" pitchFamily="18" charset="0"/>
+                            </a:rPr>
                           </m:ctrlPr>
                         </m:radPr>
                         <m:deg/>
@@ -5578,33 +5801,45 @@
                             <m:dPr>
                               <m:endChr m:val=""/>
                               <m:ctrlPr>
-                                <a:rPr lang="ar-AE" sz="1600"/>
+                                <a:rPr lang="ar-AE" sz="1600" i="1">
+                                  <a:latin typeface="Cambria Math" panose="02040503050406030204" pitchFamily="18" charset="0"/>
+                                </a:rPr>
                               </m:ctrlPr>
                             </m:dPr>
                             <m:e>
                               <m:r>
-                                <a:rPr lang="ar-AE" sz="1600" i="1"/>
+                                <a:rPr lang="ar-AE" sz="1600" i="1">
+                                  <a:latin typeface="Cambria Math" panose="02040503050406030204" pitchFamily="18" charset="0"/>
+                                </a:rPr>
                                 <m:t>𝑥</m:t>
                               </m:r>
                               <m:r>
-                                <a:rPr lang="ar-AE" sz="1600"/>
+                                <a:rPr lang="ar-AE" sz="1600">
+                                  <a:latin typeface="Cambria Math" panose="02040503050406030204" pitchFamily="18" charset="0"/>
+                                </a:rPr>
                                 <m:t>−</m:t>
                               </m:r>
                               <m:sSub>
                                 <m:sSubPr>
                                   <m:ctrlPr>
-                                    <a:rPr lang="ar-AE" sz="1600" i="1"/>
+                                    <a:rPr lang="ar-AE" sz="1600" i="1">
+                                      <a:latin typeface="Cambria Math" panose="02040503050406030204" pitchFamily="18" charset="0"/>
+                                    </a:rPr>
                                   </m:ctrlPr>
                                 </m:sSubPr>
                                 <m:e>
                                   <m:r>
-                                    <a:rPr lang="ar-AE" sz="1600" i="1"/>
+                                    <a:rPr lang="ar-AE" sz="1600" i="1">
+                                      <a:latin typeface="Cambria Math" panose="02040503050406030204" pitchFamily="18" charset="0"/>
+                                    </a:rPr>
                                     <m:t>𝑥</m:t>
                                   </m:r>
                                 </m:e>
                                 <m:sub>
                                   <m:r>
-                                    <a:rPr lang="ar-AE" sz="1600"/>
+                                    <a:rPr lang="ar-AE" sz="1600">
+                                      <a:latin typeface="Cambria Math" panose="02040503050406030204" pitchFamily="18" charset="0"/>
+                                    </a:rPr>
                                     <m:t>1</m:t>
                                   </m:r>
                                 </m:sub>
@@ -5612,7 +5847,9 @@
                               <m:sSup>
                                 <m:sSupPr>
                                   <m:ctrlPr>
-                                    <a:rPr lang="ar-AE" sz="1600" i="1"/>
+                                    <a:rPr lang="ar-AE" sz="1600" i="1">
+                                      <a:latin typeface="Cambria Math" panose="02040503050406030204" pitchFamily="18" charset="0"/>
+                                    </a:rPr>
                                   </m:ctrlPr>
                                 </m:sSupPr>
                                 <m:e>
@@ -5621,12 +5858,16 @@
                                       <m:begChr m:val=""/>
                                       <m:endChr m:val=""/>
                                       <m:ctrlPr>
-                                        <a:rPr lang="ar-AE" sz="1600" i="1"/>
+                                        <a:rPr lang="ar-AE" sz="1600" i="1">
+                                          <a:latin typeface="Cambria Math" panose="02040503050406030204" pitchFamily="18" charset="0"/>
+                                        </a:rPr>
                                       </m:ctrlPr>
                                     </m:dPr>
                                     <m:e>
                                       <m:r>
-                                        <a:rPr lang="ar-AE" sz="1600"/>
+                                        <a:rPr lang="ar-AE" sz="1600">
+                                          <a:latin typeface="Cambria Math" panose="02040503050406030204" pitchFamily="18" charset="0"/>
+                                        </a:rPr>
                                         <m:t>)</m:t>
                                       </m:r>
                                     </m:e>
@@ -5634,46 +5875,62 @@
                                 </m:e>
                                 <m:sup>
                                   <m:r>
-                                    <a:rPr lang="ar-AE" sz="1600"/>
+                                    <a:rPr lang="ar-AE" sz="1600">
+                                      <a:latin typeface="Cambria Math" panose="02040503050406030204" pitchFamily="18" charset="0"/>
+                                    </a:rPr>
                                     <m:t>2</m:t>
                                   </m:r>
                                 </m:sup>
                               </m:sSup>
                               <m:r>
-                                <a:rPr lang="ar-AE" sz="1600"/>
+                                <a:rPr lang="ar-AE" sz="1600">
+                                  <a:latin typeface="Cambria Math" panose="02040503050406030204" pitchFamily="18" charset="0"/>
+                                </a:rPr>
                                 <m:t>+</m:t>
                               </m:r>
                               <m:d>
                                 <m:dPr>
                                   <m:endChr m:val=""/>
                                   <m:ctrlPr>
-                                    <a:rPr lang="ar-AE" sz="1600" i="1"/>
+                                    <a:rPr lang="ar-AE" sz="1600" i="1">
+                                      <a:latin typeface="Cambria Math" panose="02040503050406030204" pitchFamily="18" charset="0"/>
+                                    </a:rPr>
                                   </m:ctrlPr>
                                 </m:dPr>
                                 <m:e>
                                   <m:r>
-                                    <a:rPr lang="ar-AE" sz="1600" i="1"/>
+                                    <a:rPr lang="ar-AE" sz="1600" i="1">
+                                      <a:latin typeface="Cambria Math" panose="02040503050406030204" pitchFamily="18" charset="0"/>
+                                    </a:rPr>
                                     <m:t>𝑦</m:t>
                                   </m:r>
                                   <m:r>
-                                    <a:rPr lang="ar-AE" sz="1600"/>
+                                    <a:rPr lang="ar-AE" sz="1600">
+                                      <a:latin typeface="Cambria Math" panose="02040503050406030204" pitchFamily="18" charset="0"/>
+                                    </a:rPr>
                                     <m:t>−</m:t>
                                   </m:r>
                                   <m:sSub>
                                     <m:sSubPr>
                                       <m:ctrlPr>
-                                        <a:rPr lang="ar-AE" sz="1600" i="1"/>
+                                        <a:rPr lang="ar-AE" sz="1600" i="1">
+                                          <a:latin typeface="Cambria Math" panose="02040503050406030204" pitchFamily="18" charset="0"/>
+                                        </a:rPr>
                                       </m:ctrlPr>
                                     </m:sSubPr>
                                     <m:e>
                                       <m:r>
-                                        <a:rPr lang="ar-AE" sz="1600" i="1"/>
+                                        <a:rPr lang="ar-AE" sz="1600" i="1">
+                                          <a:latin typeface="Cambria Math" panose="02040503050406030204" pitchFamily="18" charset="0"/>
+                                        </a:rPr>
                                         <m:t>𝑦</m:t>
                                       </m:r>
                                     </m:e>
                                     <m:sub>
                                       <m:r>
-                                        <a:rPr lang="ar-AE" sz="1600"/>
+                                        <a:rPr lang="ar-AE" sz="1600">
+                                          <a:latin typeface="Cambria Math" panose="02040503050406030204" pitchFamily="18" charset="0"/>
+                                        </a:rPr>
                                         <m:t>1</m:t>
                                       </m:r>
                                     </m:sub>
@@ -5681,7 +5938,9 @@
                                   <m:sSup>
                                     <m:sSupPr>
                                       <m:ctrlPr>
-                                        <a:rPr lang="ar-AE" sz="1600" i="1"/>
+                                        <a:rPr lang="ar-AE" sz="1600" i="1">
+                                          <a:latin typeface="Cambria Math" panose="02040503050406030204" pitchFamily="18" charset="0"/>
+                                        </a:rPr>
                                       </m:ctrlPr>
                                     </m:sSupPr>
                                     <m:e>
@@ -5690,12 +5949,16 @@
                                           <m:begChr m:val=""/>
                                           <m:endChr m:val=""/>
                                           <m:ctrlPr>
-                                            <a:rPr lang="ar-AE" sz="1600" i="1"/>
+                                            <a:rPr lang="ar-AE" sz="1600" i="1">
+                                              <a:latin typeface="Cambria Math" panose="02040503050406030204" pitchFamily="18" charset="0"/>
+                                            </a:rPr>
                                           </m:ctrlPr>
                                         </m:dPr>
                                         <m:e>
                                           <m:r>
-                                            <a:rPr lang="ar-AE" sz="1600"/>
+                                            <a:rPr lang="ar-AE" sz="1600">
+                                              <a:latin typeface="Cambria Math" panose="02040503050406030204" pitchFamily="18" charset="0"/>
+                                            </a:rPr>
                                             <m:t>)</m:t>
                                           </m:r>
                                         </m:e>
@@ -5703,7 +5966,9 @@
                                     </m:e>
                                     <m:sup>
                                       <m:r>
-                                        <a:rPr lang="ar-AE" sz="1600"/>
+                                        <a:rPr lang="ar-AE" sz="1600">
+                                          <a:latin typeface="Cambria Math" panose="02040503050406030204" pitchFamily="18" charset="0"/>
+                                        </a:rPr>
                                         <m:t>2</m:t>
                                       </m:r>
                                     </m:sup>
@@ -5715,14 +5980,18 @@
                         </m:e>
                       </m:rad>
                       <m:r>
-                        <a:rPr lang="ar-AE" sz="1600"/>
+                        <a:rPr lang="ar-AE" sz="1600">
+                          <a:latin typeface="Cambria Math" panose="02040503050406030204" pitchFamily="18" charset="0"/>
+                        </a:rPr>
                         <m:t>−</m:t>
                       </m:r>
                       <m:rad>
                         <m:radPr>
                           <m:degHide m:val="on"/>
                           <m:ctrlPr>
-                            <a:rPr lang="ar-AE" sz="1600" i="1"/>
+                            <a:rPr lang="ar-AE" sz="1600" i="1">
+                              <a:latin typeface="Cambria Math" panose="02040503050406030204" pitchFamily="18" charset="0"/>
+                            </a:rPr>
                           </m:ctrlPr>
                         </m:radPr>
                         <m:deg/>
@@ -5731,33 +6000,45 @@
                             <m:dPr>
                               <m:endChr m:val=""/>
                               <m:ctrlPr>
-                                <a:rPr lang="ar-AE" sz="1600" i="1"/>
+                                <a:rPr lang="ar-AE" sz="1600" i="1">
+                                  <a:latin typeface="Cambria Math" panose="02040503050406030204" pitchFamily="18" charset="0"/>
+                                </a:rPr>
                               </m:ctrlPr>
                             </m:dPr>
                             <m:e>
                               <m:r>
-                                <a:rPr lang="ar-AE" sz="1600" i="1"/>
+                                <a:rPr lang="ar-AE" sz="1600" i="1">
+                                  <a:latin typeface="Cambria Math" panose="02040503050406030204" pitchFamily="18" charset="0"/>
+                                </a:rPr>
                                 <m:t>𝑥</m:t>
                               </m:r>
                               <m:r>
-                                <a:rPr lang="ar-AE" sz="1600"/>
+                                <a:rPr lang="ar-AE" sz="1600">
+                                  <a:latin typeface="Cambria Math" panose="02040503050406030204" pitchFamily="18" charset="0"/>
+                                </a:rPr>
                                 <m:t>−</m:t>
                               </m:r>
                               <m:sSub>
                                 <m:sSubPr>
                                   <m:ctrlPr>
-                                    <a:rPr lang="ar-AE" sz="1600" i="1"/>
+                                    <a:rPr lang="ar-AE" sz="1600" i="1">
+                                      <a:latin typeface="Cambria Math" panose="02040503050406030204" pitchFamily="18" charset="0"/>
+                                    </a:rPr>
                                   </m:ctrlPr>
                                 </m:sSubPr>
                                 <m:e>
                                   <m:r>
-                                    <a:rPr lang="ar-AE" sz="1600" i="1"/>
+                                    <a:rPr lang="ar-AE" sz="1600" i="1">
+                                      <a:latin typeface="Cambria Math" panose="02040503050406030204" pitchFamily="18" charset="0"/>
+                                    </a:rPr>
                                     <m:t>𝑥</m:t>
                                   </m:r>
                                 </m:e>
                                 <m:sub>
                                   <m:r>
-                                    <a:rPr lang="ar-AE" sz="1600"/>
+                                    <a:rPr lang="ar-AE" sz="1600">
+                                      <a:latin typeface="Cambria Math" panose="02040503050406030204" pitchFamily="18" charset="0"/>
+                                    </a:rPr>
                                     <m:t>3</m:t>
                                   </m:r>
                                 </m:sub>
@@ -5765,7 +6046,9 @@
                               <m:sSup>
                                 <m:sSupPr>
                                   <m:ctrlPr>
-                                    <a:rPr lang="ar-AE" sz="1600" i="1"/>
+                                    <a:rPr lang="ar-AE" sz="1600" i="1">
+                                      <a:latin typeface="Cambria Math" panose="02040503050406030204" pitchFamily="18" charset="0"/>
+                                    </a:rPr>
                                   </m:ctrlPr>
                                 </m:sSupPr>
                                 <m:e>
@@ -5774,12 +6057,16 @@
                                       <m:begChr m:val=""/>
                                       <m:endChr m:val=""/>
                                       <m:ctrlPr>
-                                        <a:rPr lang="ar-AE" sz="1600" i="1"/>
+                                        <a:rPr lang="ar-AE" sz="1600" i="1">
+                                          <a:latin typeface="Cambria Math" panose="02040503050406030204" pitchFamily="18" charset="0"/>
+                                        </a:rPr>
                                       </m:ctrlPr>
                                     </m:dPr>
                                     <m:e>
                                       <m:r>
-                                        <a:rPr lang="ar-AE" sz="1600"/>
+                                        <a:rPr lang="ar-AE" sz="1600">
+                                          <a:latin typeface="Cambria Math" panose="02040503050406030204" pitchFamily="18" charset="0"/>
+                                        </a:rPr>
                                         <m:t>)</m:t>
                                       </m:r>
                                     </m:e>
@@ -5787,46 +6074,62 @@
                                 </m:e>
                                 <m:sup>
                                   <m:r>
-                                    <a:rPr lang="ar-AE" sz="1600"/>
+                                    <a:rPr lang="ar-AE" sz="1600">
+                                      <a:latin typeface="Cambria Math" panose="02040503050406030204" pitchFamily="18" charset="0"/>
+                                    </a:rPr>
                                     <m:t>2</m:t>
                                   </m:r>
                                 </m:sup>
                               </m:sSup>
                               <m:r>
-                                <a:rPr lang="ar-AE" sz="1600"/>
+                                <a:rPr lang="ar-AE" sz="1600">
+                                  <a:latin typeface="Cambria Math" panose="02040503050406030204" pitchFamily="18" charset="0"/>
+                                </a:rPr>
                                 <m:t>+</m:t>
                               </m:r>
                               <m:d>
                                 <m:dPr>
                                   <m:endChr m:val=""/>
                                   <m:ctrlPr>
-                                    <a:rPr lang="ar-AE" sz="1600" i="1"/>
+                                    <a:rPr lang="ar-AE" sz="1600" i="1">
+                                      <a:latin typeface="Cambria Math" panose="02040503050406030204" pitchFamily="18" charset="0"/>
+                                    </a:rPr>
                                   </m:ctrlPr>
                                 </m:dPr>
                                 <m:e>
                                   <m:r>
-                                    <a:rPr lang="ar-AE" sz="1600" i="1"/>
+                                    <a:rPr lang="ar-AE" sz="1600" i="1">
+                                      <a:latin typeface="Cambria Math" panose="02040503050406030204" pitchFamily="18" charset="0"/>
+                                    </a:rPr>
                                     <m:t>𝑦</m:t>
                                   </m:r>
                                   <m:r>
-                                    <a:rPr lang="ar-AE" sz="1600"/>
+                                    <a:rPr lang="ar-AE" sz="1600">
+                                      <a:latin typeface="Cambria Math" panose="02040503050406030204" pitchFamily="18" charset="0"/>
+                                    </a:rPr>
                                     <m:t>−</m:t>
                                   </m:r>
                                   <m:sSub>
                                     <m:sSubPr>
                                       <m:ctrlPr>
-                                        <a:rPr lang="ar-AE" sz="1600" i="1"/>
+                                        <a:rPr lang="ar-AE" sz="1600" i="1">
+                                          <a:latin typeface="Cambria Math" panose="02040503050406030204" pitchFamily="18" charset="0"/>
+                                        </a:rPr>
                                       </m:ctrlPr>
                                     </m:sSubPr>
                                     <m:e>
                                       <m:r>
-                                        <a:rPr lang="ar-AE" sz="1600" i="1"/>
+                                        <a:rPr lang="ar-AE" sz="1600" i="1">
+                                          <a:latin typeface="Cambria Math" panose="02040503050406030204" pitchFamily="18" charset="0"/>
+                                        </a:rPr>
                                         <m:t>𝑦</m:t>
                                       </m:r>
                                     </m:e>
                                     <m:sub>
                                       <m:r>
-                                        <a:rPr lang="ar-AE" sz="1600"/>
+                                        <a:rPr lang="ar-AE" sz="1600">
+                                          <a:latin typeface="Cambria Math" panose="02040503050406030204" pitchFamily="18" charset="0"/>
+                                        </a:rPr>
                                         <m:t>3</m:t>
                                       </m:r>
                                     </m:sub>
@@ -5834,7 +6137,9 @@
                                   <m:sSup>
                                     <m:sSupPr>
                                       <m:ctrlPr>
-                                        <a:rPr lang="ar-AE" sz="1600" i="1"/>
+                                        <a:rPr lang="ar-AE" sz="1600" i="1">
+                                          <a:latin typeface="Cambria Math" panose="02040503050406030204" pitchFamily="18" charset="0"/>
+                                        </a:rPr>
                                       </m:ctrlPr>
                                     </m:sSupPr>
                                     <m:e>
@@ -5843,12 +6148,16 @@
                                           <m:begChr m:val=""/>
                                           <m:endChr m:val=""/>
                                           <m:ctrlPr>
-                                            <a:rPr lang="ar-AE" sz="1600" i="1"/>
+                                            <a:rPr lang="ar-AE" sz="1600" i="1">
+                                              <a:latin typeface="Cambria Math" panose="02040503050406030204" pitchFamily="18" charset="0"/>
+                                            </a:rPr>
                                           </m:ctrlPr>
                                         </m:dPr>
                                         <m:e>
                                           <m:r>
-                                            <a:rPr lang="ar-AE" sz="1600"/>
+                                            <a:rPr lang="ar-AE" sz="1600">
+                                              <a:latin typeface="Cambria Math" panose="02040503050406030204" pitchFamily="18" charset="0"/>
+                                            </a:rPr>
                                             <m:t>)</m:t>
                                           </m:r>
                                         </m:e>
@@ -5856,7 +6165,9 @@
                                     </m:e>
                                     <m:sup>
                                       <m:r>
-                                        <a:rPr lang="ar-AE" sz="1600"/>
+                                        <a:rPr lang="ar-AE" sz="1600">
+                                          <a:latin typeface="Cambria Math" panose="02040503050406030204" pitchFamily="18" charset="0"/>
+                                        </a:rPr>
                                         <m:t>2</m:t>
                                       </m:r>
                                     </m:sup>
@@ -5868,24 +6179,32 @@
                         </m:e>
                       </m:rad>
                       <m:r>
-                        <a:rPr lang="ar-AE" sz="1600"/>
+                        <a:rPr lang="ar-AE" sz="1600">
+                          <a:latin typeface="Cambria Math" panose="02040503050406030204" pitchFamily="18" charset="0"/>
+                        </a:rPr>
                         <m:t>=</m:t>
                       </m:r>
                       <m:sSub>
                         <m:sSubPr>
                           <m:ctrlPr>
-                            <a:rPr lang="ar-AE" sz="1600" i="1"/>
+                            <a:rPr lang="ar-AE" sz="1600" i="1">
+                              <a:latin typeface="Cambria Math" panose="02040503050406030204" pitchFamily="18" charset="0"/>
+                            </a:rPr>
                           </m:ctrlPr>
                         </m:sSubPr>
                         <m:e>
                           <m:r>
-                            <a:rPr lang="ar-AE" sz="1600" i="1"/>
+                            <a:rPr lang="ar-AE" sz="1600" i="1">
+                              <a:latin typeface="Cambria Math" panose="02040503050406030204" pitchFamily="18" charset="0"/>
+                            </a:rPr>
                             <m:t>𝑑</m:t>
                           </m:r>
                         </m:e>
                         <m:sub>
                           <m:r>
-                            <a:rPr lang="ar-AE" sz="1600"/>
+                            <a:rPr lang="ar-AE" sz="1600">
+                              <a:latin typeface="Cambria Math" panose="02040503050406030204" pitchFamily="18" charset="0"/>
+                            </a:rPr>
                             <m:t>13</m:t>
                           </m:r>
                         </m:sub>
@@ -5955,7 +6274,7 @@
             </p:nvSpPr>
             <p:spPr>
               <a:xfrm>
-                <a:off x="5908936" y="2545271"/>
+                <a:off x="5765904" y="2523499"/>
                 <a:ext cx="6165640" cy="3719288"/>
               </a:xfrm>
               <a:prstGeom prst="rect">
@@ -5964,7 +6283,7 @@
               <a:blipFill>
                 <a:blip r:embed="rId4"/>
                 <a:stretch>
-                  <a:fillRect l="-791"/>
+                  <a:fillRect l="-890"/>
                 </a:stretch>
               </a:blipFill>
             </p:spPr>
@@ -5999,8 +6318,8 @@
             </p:nvSpPr>
             <p:spPr>
               <a:xfrm>
-                <a:off x="5908936" y="2332456"/>
-                <a:ext cx="1848776" cy="582147"/>
+                <a:off x="5765904" y="2341432"/>
+                <a:ext cx="1824859" cy="527773"/>
               </a:xfrm>
               <a:prstGeom prst="rect">
                 <a:avLst/>
@@ -6014,15 +6333,15 @@
               <a:lstStyle/>
               <a:p>
                 <a:r>
-                  <a:rPr lang="en-IN" dirty="0"/>
+                  <a:rPr lang="en-IN" sz="1600" dirty="0"/>
                   <a:t>Tx (</a:t>
                 </a:r>
                 <a:r>
-                  <a:rPr lang="en-IN" dirty="0" err="1"/>
+                  <a:rPr lang="en-IN" sz="1600" dirty="0" err="1"/>
                   <a:t>x,y</a:t>
                 </a:r>
                 <a:r>
-                  <a:rPr lang="en-IN" dirty="0"/>
+                  <a:rPr lang="en-IN" sz="1600" dirty="0"/>
                   <a:t>): </a:t>
                 </a:r>
                 <a14:m>
@@ -6030,7 +6349,7 @@
                     <m:d>
                       <m:dPr>
                         <m:ctrlPr>
-                          <a:rPr lang="en-IN" i="1">
+                          <a:rPr lang="en-IN" sz="1600" i="1">
                             <a:latin typeface="Cambria Math" panose="02040503050406030204" pitchFamily="18" charset="0"/>
                           </a:rPr>
                         </m:ctrlPr>
@@ -6039,14 +6358,14 @@
                         <m:f>
                           <m:fPr>
                             <m:ctrlPr>
-                              <a:rPr lang="en-IN" i="1">
+                              <a:rPr lang="en-IN" sz="1600" i="1">
                                 <a:latin typeface="Cambria Math" panose="02040503050406030204" pitchFamily="18" charset="0"/>
                               </a:rPr>
                             </m:ctrlPr>
                           </m:fPr>
                           <m:num>
                             <m:r>
-                              <a:rPr lang="en-IN" i="1">
+                              <a:rPr lang="en-IN" sz="1600" i="1">
                                 <a:latin typeface="Cambria Math" panose="02040503050406030204" pitchFamily="18" charset="0"/>
                               </a:rPr>
                               <m:t>𝑎</m:t>
@@ -6054,7 +6373,7 @@
                           </m:num>
                           <m:den>
                             <m:r>
-                              <a:rPr lang="en-IN" i="1">
+                              <a:rPr lang="en-IN" sz="1600" i="1">
                                 <a:latin typeface="Cambria Math" panose="02040503050406030204" pitchFamily="18" charset="0"/>
                               </a:rPr>
                               <m:t>3</m:t>
@@ -6062,19 +6381,19 @@
                           </m:den>
                         </m:f>
                         <m:r>
-                          <a:rPr lang="en-IN" i="1">
+                          <a:rPr lang="en-IN" sz="1600" i="1">
                             <a:latin typeface="Cambria Math" panose="02040503050406030204" pitchFamily="18" charset="0"/>
                           </a:rPr>
                           <m:t>,</m:t>
                         </m:r>
                         <m:r>
-                          <a:rPr lang="en-IN" i="1">
+                          <a:rPr lang="en-IN" sz="1600" i="1">
                             <a:latin typeface="Cambria Math" panose="02040503050406030204" pitchFamily="18" charset="0"/>
                           </a:rPr>
                           <m:t>𝑎</m:t>
                         </m:r>
                         <m:r>
-                          <a:rPr lang="en-IN" i="1">
+                          <a:rPr lang="en-IN" sz="1600" i="1">
                             <a:latin typeface="Cambria Math" panose="02040503050406030204" pitchFamily="18" charset="0"/>
                           </a:rPr>
                           <m:t>.</m:t>
@@ -6082,7 +6401,7 @@
                         <m:f>
                           <m:fPr>
                             <m:ctrlPr>
-                              <a:rPr lang="en-IN" i="1">
+                              <a:rPr lang="en-IN" sz="1600" i="1">
                                 <a:latin typeface="Cambria Math" panose="02040503050406030204" pitchFamily="18" charset="0"/>
                               </a:rPr>
                             </m:ctrlPr>
@@ -6092,7 +6411,7 @@
                               <m:radPr>
                                 <m:degHide m:val="on"/>
                                 <m:ctrlPr>
-                                  <a:rPr lang="en-IN" i="1">
+                                  <a:rPr lang="en-IN" sz="1600" i="1">
                                     <a:latin typeface="Cambria Math" panose="02040503050406030204" pitchFamily="18" charset="0"/>
                                   </a:rPr>
                                 </m:ctrlPr>
@@ -6100,7 +6419,7 @@
                               <m:deg/>
                               <m:e>
                                 <m:r>
-                                  <a:rPr lang="en-IN" i="1">
+                                  <a:rPr lang="en-IN" sz="1600" i="1">
                                     <a:latin typeface="Cambria Math" panose="02040503050406030204" pitchFamily="18" charset="0"/>
                                   </a:rPr>
                                   <m:t>3</m:t>
@@ -6110,7 +6429,7 @@
                           </m:num>
                           <m:den>
                             <m:r>
-                              <a:rPr lang="en-IN" i="1">
+                              <a:rPr lang="en-IN" sz="1600" i="1">
                                 <a:latin typeface="Cambria Math" panose="02040503050406030204" pitchFamily="18" charset="0"/>
                               </a:rPr>
                               <m:t>6</m:t>
@@ -6143,8 +6462,8 @@
             </p:nvSpPr>
             <p:spPr>
               <a:xfrm>
-                <a:off x="5908936" y="2332456"/>
-                <a:ext cx="1848776" cy="582147"/>
+                <a:off x="5765904" y="2341432"/>
+                <a:ext cx="1824859" cy="527773"/>
               </a:xfrm>
               <a:prstGeom prst="rect">
                 <a:avLst/>
@@ -6152,7 +6471,7 @@
               <a:blipFill>
                 <a:blip r:embed="rId5"/>
                 <a:stretch>
-                  <a:fillRect l="-2632"/>
+                  <a:fillRect l="-2007"/>
                 </a:stretch>
               </a:blipFill>
             </p:spPr>
@@ -6520,8 +6839,8 @@
           <a:chExt cx="0" cy="0"/>
         </a:xfrm>
       </p:grpSpPr>
-      <mc:AlternateContent xmlns:mc="http://schemas.openxmlformats.org/markup-compatibility/2006">
-        <mc:Choice xmlns:a14="http://schemas.microsoft.com/office/drawing/2010/main" Requires="a14">
+      <mc:AlternateContent xmlns:mc="http://schemas.openxmlformats.org/markup-compatibility/2006" xmlns:a14="http://schemas.microsoft.com/office/drawing/2010/main">
+        <mc:Choice Requires="a14">
           <p:sp>
             <p:nvSpPr>
               <p:cNvPr id="2" name="TextBox 1">
@@ -6556,6 +6875,7 @@
                 </a:r>
               </a:p>
               <a:p>
+                <a:pPr/>
                 <a14:m>
                   <m:oMathPara xmlns:m="http://schemas.openxmlformats.org/officeDocument/2006/math">
                     <m:oMathParaPr>
@@ -6565,79 +6885,107 @@
                       <m:sSub>
                         <m:sSubPr>
                           <m:ctrlPr>
-                            <a:rPr lang="ar-AE" smtClean="0"/>
+                            <a:rPr lang="ar-AE" i="1" smtClean="0">
+                              <a:latin typeface="Cambria Math" panose="02040503050406030204" pitchFamily="18" charset="0"/>
+                            </a:rPr>
                           </m:ctrlPr>
                         </m:sSubPr>
                         <m:e>
                           <m:r>
-                            <a:rPr lang="ar-AE" i="1"/>
+                            <a:rPr lang="ar-AE" i="1">
+                              <a:latin typeface="Cambria Math" panose="02040503050406030204" pitchFamily="18" charset="0"/>
+                            </a:rPr>
                             <m:t>𝑑</m:t>
                           </m:r>
                         </m:e>
                         <m:sub>
                           <m:r>
-                            <a:rPr lang="ar-AE" i="1"/>
+                            <a:rPr lang="ar-AE" i="1">
+                              <a:latin typeface="Cambria Math" panose="02040503050406030204" pitchFamily="18" charset="0"/>
+                            </a:rPr>
                             <m:t>𝑖𝑗</m:t>
                           </m:r>
                         </m:sub>
                       </m:sSub>
                       <m:r>
-                        <a:rPr lang="ar-AE"/>
+                        <a:rPr lang="ar-AE">
+                          <a:latin typeface="Cambria Math" panose="02040503050406030204" pitchFamily="18" charset="0"/>
+                        </a:rPr>
                         <m:t>=</m:t>
                       </m:r>
                       <m:r>
-                        <a:rPr lang="ar-AE" i="1"/>
+                        <a:rPr lang="ar-AE" i="1">
+                          <a:latin typeface="Cambria Math" panose="02040503050406030204" pitchFamily="18" charset="0"/>
+                        </a:rPr>
                         <m:t>𝑐</m:t>
                       </m:r>
                       <m:r>
-                        <a:rPr lang="ar-AE"/>
+                        <a:rPr lang="ar-AE">
+                          <a:latin typeface="Cambria Math" panose="02040503050406030204" pitchFamily="18" charset="0"/>
+                        </a:rPr>
                         <m:t>×</m:t>
                       </m:r>
                       <m:d>
                         <m:dPr>
                           <m:ctrlPr>
-                            <a:rPr lang="ar-AE" i="1"/>
+                            <a:rPr lang="ar-AE" i="1">
+                              <a:latin typeface="Cambria Math" panose="02040503050406030204" pitchFamily="18" charset="0"/>
+                            </a:rPr>
                           </m:ctrlPr>
                         </m:dPr>
                         <m:e>
                           <m:sSub>
                             <m:sSubPr>
                               <m:ctrlPr>
-                                <a:rPr lang="ar-AE" i="1"/>
+                                <a:rPr lang="ar-AE" i="1">
+                                  <a:latin typeface="Cambria Math" panose="02040503050406030204" pitchFamily="18" charset="0"/>
+                                </a:rPr>
                               </m:ctrlPr>
                             </m:sSubPr>
                             <m:e>
                               <m:r>
-                                <a:rPr lang="ar-AE" i="1"/>
+                                <a:rPr lang="ar-AE" i="1">
+                                  <a:latin typeface="Cambria Math" panose="02040503050406030204" pitchFamily="18" charset="0"/>
+                                </a:rPr>
                                 <m:t>𝑇</m:t>
                               </m:r>
                             </m:e>
                             <m:sub>
                               <m:r>
-                                <a:rPr lang="ar-AE" i="1"/>
+                                <a:rPr lang="ar-AE" i="1">
+                                  <a:latin typeface="Cambria Math" panose="02040503050406030204" pitchFamily="18" charset="0"/>
+                                </a:rPr>
                                 <m:t>𝑖</m:t>
                               </m:r>
                             </m:sub>
                           </m:sSub>
                           <m:r>
-                            <a:rPr lang="ar-AE"/>
+                            <a:rPr lang="ar-AE">
+                              <a:latin typeface="Cambria Math" panose="02040503050406030204" pitchFamily="18" charset="0"/>
+                            </a:rPr>
                             <m:t>−</m:t>
                           </m:r>
                           <m:sSub>
                             <m:sSubPr>
                               <m:ctrlPr>
-                                <a:rPr lang="ar-AE" i="1"/>
+                                <a:rPr lang="ar-AE" i="1">
+                                  <a:latin typeface="Cambria Math" panose="02040503050406030204" pitchFamily="18" charset="0"/>
+                                </a:rPr>
                               </m:ctrlPr>
                             </m:sSubPr>
                             <m:e>
                               <m:r>
-                                <a:rPr lang="ar-AE" i="1"/>
+                                <a:rPr lang="ar-AE" i="1">
+                                  <a:latin typeface="Cambria Math" panose="02040503050406030204" pitchFamily="18" charset="0"/>
+                                </a:rPr>
                                 <m:t>𝑇</m:t>
                               </m:r>
                             </m:e>
                             <m:sub>
                               <m:r>
-                                <a:rPr lang="ar-AE" i="1"/>
+                                <a:rPr lang="ar-AE" i="1">
+                                  <a:latin typeface="Cambria Math" panose="02040503050406030204" pitchFamily="18" charset="0"/>
+                                </a:rPr>
                                 <m:t>𝑗</m:t>
                               </m:r>
                             </m:sub>
@@ -6655,7 +7003,7 @@
             </p:txBody>
           </p:sp>
         </mc:Choice>
-        <mc:Fallback>
+        <mc:Fallback xmlns="">
           <p:sp>
             <p:nvSpPr>
               <p:cNvPr id="2" name="TextBox 1">
@@ -6772,8 +7120,180 @@
         </p:blipFill>
         <p:spPr>
           <a:xfrm>
-            <a:off x="3020517" y="2009012"/>
+            <a:off x="374754" y="1885640"/>
             <a:ext cx="4956747" cy="4705289"/>
+          </a:xfrm>
+          <a:prstGeom prst="rect">
+            <a:avLst/>
+          </a:prstGeom>
+        </p:spPr>
+      </p:pic>
+      <p:cxnSp>
+        <p:nvCxnSpPr>
+          <p:cNvPr id="11" name="Straight Arrow Connector 10">
+            <a:extLst>
+              <a:ext uri="{FF2B5EF4-FFF2-40B4-BE49-F238E27FC236}">
+                <a16:creationId xmlns:a16="http://schemas.microsoft.com/office/drawing/2014/main" id="{3CDFD669-9677-04BB-501E-5DD1192069A5}"/>
+              </a:ext>
+            </a:extLst>
+          </p:cNvPr>
+          <p:cNvCxnSpPr/>
+          <p:nvPr/>
+        </p:nvCxnSpPr>
+        <p:spPr>
+          <a:xfrm>
+            <a:off x="3744686" y="1058091"/>
+            <a:ext cx="2351314" cy="0"/>
+          </a:xfrm>
+          <a:prstGeom prst="straightConnector1">
+            <a:avLst/>
+          </a:prstGeom>
+          <a:ln>
+            <a:tailEnd type="triangle"/>
+          </a:ln>
+        </p:spPr>
+        <p:style>
+          <a:lnRef idx="3">
+            <a:schemeClr val="dk1"/>
+          </a:lnRef>
+          <a:fillRef idx="0">
+            <a:schemeClr val="dk1"/>
+          </a:fillRef>
+          <a:effectRef idx="2">
+            <a:schemeClr val="dk1"/>
+          </a:effectRef>
+          <a:fontRef idx="minor">
+            <a:schemeClr val="tx1"/>
+          </a:fontRef>
+        </p:style>
+      </p:cxnSp>
+      <p:sp>
+        <p:nvSpPr>
+          <p:cNvPr id="12" name="TextBox 11">
+            <a:extLst>
+              <a:ext uri="{FF2B5EF4-FFF2-40B4-BE49-F238E27FC236}">
+                <a16:creationId xmlns:a16="http://schemas.microsoft.com/office/drawing/2014/main" id="{83F3DE8D-3FB0-461E-EEA1-9859840D9F82}"/>
+              </a:ext>
+            </a:extLst>
+          </p:cNvPr>
+          <p:cNvSpPr txBox="1"/>
+          <p:nvPr/>
+        </p:nvSpPr>
+        <p:spPr>
+          <a:xfrm>
+            <a:off x="6156959" y="870858"/>
+            <a:ext cx="5964284" cy="523220"/>
+          </a:xfrm>
+          <a:prstGeom prst="rect">
+            <a:avLst/>
+          </a:prstGeom>
+          <a:noFill/>
+        </p:spPr>
+        <p:txBody>
+          <a:bodyPr wrap="square" rtlCol="0">
+            <a:spAutoFit/>
+          </a:bodyPr>
+          <a:lstStyle/>
+          <a:p>
+            <a:r>
+              <a:rPr lang="en-IN" sz="1400" dirty="0">
+                <a:highlight>
+                  <a:srgbClr val="FFFF00"/>
+                </a:highlight>
+              </a:rPr>
+              <a:t>Time Delay calculated via cross correlation of time signals received </a:t>
+            </a:r>
+          </a:p>
+          <a:p>
+            <a:r>
+              <a:rPr lang="en-IN" sz="1400" dirty="0">
+                <a:highlight>
+                  <a:srgbClr val="FFFF00"/>
+                </a:highlight>
+              </a:rPr>
+              <a:t>by both receivers (signal processing part!)</a:t>
+            </a:r>
+          </a:p>
+        </p:txBody>
+      </p:sp>
+      <p:sp>
+        <p:nvSpPr>
+          <p:cNvPr id="13" name="TextBox 12">
+            <a:extLst>
+              <a:ext uri="{FF2B5EF4-FFF2-40B4-BE49-F238E27FC236}">
+                <a16:creationId xmlns:a16="http://schemas.microsoft.com/office/drawing/2014/main" id="{B2D6C788-3391-2B5F-BA0F-12229F01AA2B}"/>
+              </a:ext>
+            </a:extLst>
+          </p:cNvPr>
+          <p:cNvSpPr txBox="1"/>
+          <p:nvPr/>
+        </p:nvSpPr>
+        <p:spPr>
+          <a:xfrm>
+            <a:off x="5331501" y="2089570"/>
+            <a:ext cx="5298695" cy="646331"/>
+          </a:xfrm>
+          <a:prstGeom prst="rect">
+            <a:avLst/>
+          </a:prstGeom>
+          <a:noFill/>
+        </p:spPr>
+        <p:txBody>
+          <a:bodyPr wrap="none" rtlCol="0">
+            <a:spAutoFit/>
+          </a:bodyPr>
+          <a:lstStyle/>
+          <a:p>
+            <a:r>
+              <a:rPr lang="en-IN" dirty="0"/>
+              <a:t>Accuracy Depends on how accurately we calculate </a:t>
+            </a:r>
+            <a:r>
+              <a:rPr lang="en-IN" dirty="0" err="1"/>
+              <a:t>dij</a:t>
+            </a:r>
+            <a:r>
+              <a:rPr lang="en-IN" dirty="0"/>
+              <a:t> !</a:t>
+            </a:r>
+          </a:p>
+          <a:p>
+            <a:r>
+              <a:rPr lang="en-IN" dirty="0"/>
+              <a:t>Figure Below shows 10-15% Error in calculation of </a:t>
+            </a:r>
+            <a:r>
+              <a:rPr lang="en-IN" dirty="0" err="1"/>
+              <a:t>dij</a:t>
+            </a:r>
+            <a:endParaRPr lang="en-IN" dirty="0"/>
+          </a:p>
+        </p:txBody>
+      </p:sp>
+      <p:pic>
+        <p:nvPicPr>
+          <p:cNvPr id="15" name="Picture 14">
+            <a:extLst>
+              <a:ext uri="{FF2B5EF4-FFF2-40B4-BE49-F238E27FC236}">
+                <a16:creationId xmlns:a16="http://schemas.microsoft.com/office/drawing/2014/main" id="{7EB10A62-3F2F-DC1B-3803-9EF0DDC8C866}"/>
+              </a:ext>
+            </a:extLst>
+          </p:cNvPr>
+          <p:cNvPicPr>
+            <a:picLocks noChangeAspect="1"/>
+          </p:cNvPicPr>
+          <p:nvPr/>
+        </p:nvPicPr>
+        <p:blipFill>
+          <a:blip r:embed="rId4"/>
+          <a:stretch>
+            <a:fillRect/>
+          </a:stretch>
+        </p:blipFill>
+        <p:spPr>
+          <a:xfrm>
+            <a:off x="5988821" y="2829533"/>
+            <a:ext cx="4715465" cy="4028467"/>
           </a:xfrm>
           <a:prstGeom prst="rect">
             <a:avLst/>
@@ -6784,6 +7304,824 @@
     <p:extLst>
       <p:ext uri="{BB962C8B-B14F-4D97-AF65-F5344CB8AC3E}">
         <p14:creationId xmlns:p14="http://schemas.microsoft.com/office/powerpoint/2010/main" val="3713629345"/>
+      </p:ext>
+    </p:extLst>
+  </p:cSld>
+  <p:clrMapOvr>
+    <a:masterClrMapping/>
+  </p:clrMapOvr>
+  <p:timing>
+    <p:tnLst>
+      <p:par>
+        <p:cTn id="1" dur="indefinite" restart="never" nodeType="tmRoot">
+          <p:childTnLst>
+            <p:seq concurrent="1" nextAc="seek">
+              <p:cTn id="2" dur="indefinite" nodeType="mainSeq">
+                <p:childTnLst>
+                  <p:par>
+                    <p:cTn id="3" fill="hold">
+                      <p:stCondLst>
+                        <p:cond delay="indefinite"/>
+                      </p:stCondLst>
+                      <p:childTnLst>
+                        <p:par>
+                          <p:cTn id="4" fill="hold">
+                            <p:stCondLst>
+                              <p:cond delay="0"/>
+                            </p:stCondLst>
+                            <p:childTnLst>
+                              <p:par>
+                                <p:cTn id="5" presetID="10" presetClass="entr" presetSubtype="0" fill="hold" nodeType="clickEffect">
+                                  <p:stCondLst>
+                                    <p:cond delay="0"/>
+                                  </p:stCondLst>
+                                  <p:childTnLst>
+                                    <p:set>
+                                      <p:cBhvr>
+                                        <p:cTn id="6" dur="1" fill="hold">
+                                          <p:stCondLst>
+                                            <p:cond delay="0"/>
+                                          </p:stCondLst>
+                                        </p:cTn>
+                                        <p:tgtEl>
+                                          <p:spTgt spid="11"/>
+                                        </p:tgtEl>
+                                        <p:attrNameLst>
+                                          <p:attrName>style.visibility</p:attrName>
+                                        </p:attrNameLst>
+                                      </p:cBhvr>
+                                      <p:to>
+                                        <p:strVal val="visible"/>
+                                      </p:to>
+                                    </p:set>
+                                    <p:animEffect transition="in" filter="fade">
+                                      <p:cBhvr>
+                                        <p:cTn id="7" dur="500"/>
+                                        <p:tgtEl>
+                                          <p:spTgt spid="11"/>
+                                        </p:tgtEl>
+                                      </p:cBhvr>
+                                    </p:animEffect>
+                                  </p:childTnLst>
+                                </p:cTn>
+                              </p:par>
+                              <p:par>
+                                <p:cTn id="8" presetID="10" presetClass="entr" presetSubtype="0" fill="hold" grpId="0" nodeType="withEffect">
+                                  <p:stCondLst>
+                                    <p:cond delay="0"/>
+                                  </p:stCondLst>
+                                  <p:childTnLst>
+                                    <p:set>
+                                      <p:cBhvr>
+                                        <p:cTn id="9" dur="1" fill="hold">
+                                          <p:stCondLst>
+                                            <p:cond delay="0"/>
+                                          </p:stCondLst>
+                                        </p:cTn>
+                                        <p:tgtEl>
+                                          <p:spTgt spid="12"/>
+                                        </p:tgtEl>
+                                        <p:attrNameLst>
+                                          <p:attrName>style.visibility</p:attrName>
+                                        </p:attrNameLst>
+                                      </p:cBhvr>
+                                      <p:to>
+                                        <p:strVal val="visible"/>
+                                      </p:to>
+                                    </p:set>
+                                    <p:animEffect transition="in" filter="fade">
+                                      <p:cBhvr>
+                                        <p:cTn id="10" dur="500"/>
+                                        <p:tgtEl>
+                                          <p:spTgt spid="12"/>
+                                        </p:tgtEl>
+                                      </p:cBhvr>
+                                    </p:animEffect>
+                                  </p:childTnLst>
+                                </p:cTn>
+                              </p:par>
+                            </p:childTnLst>
+                          </p:cTn>
+                        </p:par>
+                      </p:childTnLst>
+                    </p:cTn>
+                  </p:par>
+                  <p:par>
+                    <p:cTn id="11" fill="hold">
+                      <p:stCondLst>
+                        <p:cond delay="indefinite"/>
+                      </p:stCondLst>
+                      <p:childTnLst>
+                        <p:par>
+                          <p:cTn id="12" fill="hold">
+                            <p:stCondLst>
+                              <p:cond delay="0"/>
+                            </p:stCondLst>
+                            <p:childTnLst>
+                              <p:par>
+                                <p:cTn id="13" presetID="10" presetClass="entr" presetSubtype="0" fill="hold" grpId="0" nodeType="clickEffect">
+                                  <p:stCondLst>
+                                    <p:cond delay="0"/>
+                                  </p:stCondLst>
+                                  <p:childTnLst>
+                                    <p:set>
+                                      <p:cBhvr>
+                                        <p:cTn id="14" dur="1" fill="hold">
+                                          <p:stCondLst>
+                                            <p:cond delay="0"/>
+                                          </p:stCondLst>
+                                        </p:cTn>
+                                        <p:tgtEl>
+                                          <p:spTgt spid="3"/>
+                                        </p:tgtEl>
+                                        <p:attrNameLst>
+                                          <p:attrName>style.visibility</p:attrName>
+                                        </p:attrNameLst>
+                                      </p:cBhvr>
+                                      <p:to>
+                                        <p:strVal val="visible"/>
+                                      </p:to>
+                                    </p:set>
+                                    <p:animEffect transition="in" filter="fade">
+                                      <p:cBhvr>
+                                        <p:cTn id="15" dur="500"/>
+                                        <p:tgtEl>
+                                          <p:spTgt spid="3"/>
+                                        </p:tgtEl>
+                                      </p:cBhvr>
+                                    </p:animEffect>
+                                  </p:childTnLst>
+                                </p:cTn>
+                              </p:par>
+                              <p:par>
+                                <p:cTn id="16" presetID="10" presetClass="entr" presetSubtype="0" fill="hold" nodeType="withEffect">
+                                  <p:stCondLst>
+                                    <p:cond delay="0"/>
+                                  </p:stCondLst>
+                                  <p:childTnLst>
+                                    <p:set>
+                                      <p:cBhvr>
+                                        <p:cTn id="17" dur="1" fill="hold">
+                                          <p:stCondLst>
+                                            <p:cond delay="0"/>
+                                          </p:stCondLst>
+                                        </p:cTn>
+                                        <p:tgtEl>
+                                          <p:spTgt spid="5"/>
+                                        </p:tgtEl>
+                                        <p:attrNameLst>
+                                          <p:attrName>style.visibility</p:attrName>
+                                        </p:attrNameLst>
+                                      </p:cBhvr>
+                                      <p:to>
+                                        <p:strVal val="visible"/>
+                                      </p:to>
+                                    </p:set>
+                                    <p:animEffect transition="in" filter="fade">
+                                      <p:cBhvr>
+                                        <p:cTn id="18" dur="500"/>
+                                        <p:tgtEl>
+                                          <p:spTgt spid="5"/>
+                                        </p:tgtEl>
+                                      </p:cBhvr>
+                                    </p:animEffect>
+                                  </p:childTnLst>
+                                </p:cTn>
+                              </p:par>
+                            </p:childTnLst>
+                          </p:cTn>
+                        </p:par>
+                      </p:childTnLst>
+                    </p:cTn>
+                  </p:par>
+                  <p:par>
+                    <p:cTn id="19" fill="hold">
+                      <p:stCondLst>
+                        <p:cond delay="indefinite"/>
+                      </p:stCondLst>
+                      <p:childTnLst>
+                        <p:par>
+                          <p:cTn id="20" fill="hold">
+                            <p:stCondLst>
+                              <p:cond delay="0"/>
+                            </p:stCondLst>
+                            <p:childTnLst>
+                              <p:par>
+                                <p:cTn id="21" presetID="10" presetClass="entr" presetSubtype="0" fill="hold" grpId="0" nodeType="clickEffect">
+                                  <p:stCondLst>
+                                    <p:cond delay="0"/>
+                                  </p:stCondLst>
+                                  <p:childTnLst>
+                                    <p:set>
+                                      <p:cBhvr>
+                                        <p:cTn id="22" dur="1" fill="hold">
+                                          <p:stCondLst>
+                                            <p:cond delay="0"/>
+                                          </p:stCondLst>
+                                        </p:cTn>
+                                        <p:tgtEl>
+                                          <p:spTgt spid="13"/>
+                                        </p:tgtEl>
+                                        <p:attrNameLst>
+                                          <p:attrName>style.visibility</p:attrName>
+                                        </p:attrNameLst>
+                                      </p:cBhvr>
+                                      <p:to>
+                                        <p:strVal val="visible"/>
+                                      </p:to>
+                                    </p:set>
+                                    <p:animEffect transition="in" filter="fade">
+                                      <p:cBhvr>
+                                        <p:cTn id="23" dur="500"/>
+                                        <p:tgtEl>
+                                          <p:spTgt spid="13"/>
+                                        </p:tgtEl>
+                                      </p:cBhvr>
+                                    </p:animEffect>
+                                  </p:childTnLst>
+                                </p:cTn>
+                              </p:par>
+                              <p:par>
+                                <p:cTn id="24" presetID="10" presetClass="entr" presetSubtype="0" fill="hold" nodeType="withEffect">
+                                  <p:stCondLst>
+                                    <p:cond delay="0"/>
+                                  </p:stCondLst>
+                                  <p:childTnLst>
+                                    <p:set>
+                                      <p:cBhvr>
+                                        <p:cTn id="25" dur="1" fill="hold">
+                                          <p:stCondLst>
+                                            <p:cond delay="0"/>
+                                          </p:stCondLst>
+                                        </p:cTn>
+                                        <p:tgtEl>
+                                          <p:spTgt spid="15"/>
+                                        </p:tgtEl>
+                                        <p:attrNameLst>
+                                          <p:attrName>style.visibility</p:attrName>
+                                        </p:attrNameLst>
+                                      </p:cBhvr>
+                                      <p:to>
+                                        <p:strVal val="visible"/>
+                                      </p:to>
+                                    </p:set>
+                                    <p:animEffect transition="in" filter="fade">
+                                      <p:cBhvr>
+                                        <p:cTn id="26" dur="500"/>
+                                        <p:tgtEl>
+                                          <p:spTgt spid="15"/>
+                                        </p:tgtEl>
+                                      </p:cBhvr>
+                                    </p:animEffect>
+                                  </p:childTnLst>
+                                </p:cTn>
+                              </p:par>
+                            </p:childTnLst>
+                          </p:cTn>
+                        </p:par>
+                      </p:childTnLst>
+                    </p:cTn>
+                  </p:par>
+                </p:childTnLst>
+              </p:cTn>
+              <p:prevCondLst>
+                <p:cond evt="onPrev" delay="0">
+                  <p:tgtEl>
+                    <p:sldTgt/>
+                  </p:tgtEl>
+                </p:cond>
+              </p:prevCondLst>
+              <p:nextCondLst>
+                <p:cond evt="onNext" delay="0">
+                  <p:tgtEl>
+                    <p:sldTgt/>
+                  </p:tgtEl>
+                </p:cond>
+              </p:nextCondLst>
+            </p:seq>
+          </p:childTnLst>
+        </p:cTn>
+      </p:par>
+    </p:tnLst>
+    <p:bldLst>
+      <p:bldP spid="3" grpId="0"/>
+      <p:bldP spid="12" grpId="0"/>
+      <p:bldP spid="13" grpId="0"/>
+    </p:bldLst>
+  </p:timing>
+</p:sld>
+</file>
+
+<file path=ppt/slides/slide5.xml><?xml version="1.0" encoding="utf-8"?>
+<p:sld xmlns:a="http://schemas.openxmlformats.org/drawingml/2006/main" xmlns:r="http://schemas.openxmlformats.org/officeDocument/2006/relationships" xmlns:p="http://schemas.openxmlformats.org/presentationml/2006/main">
+  <p:cSld>
+    <p:spTree>
+      <p:nvGrpSpPr>
+        <p:cNvPr id="1" name=""/>
+        <p:cNvGrpSpPr/>
+        <p:nvPr/>
+      </p:nvGrpSpPr>
+      <p:grpSpPr>
+        <a:xfrm>
+          <a:off x="0" y="0"/>
+          <a:ext cx="0" cy="0"/>
+          <a:chOff x="0" y="0"/>
+          <a:chExt cx="0" cy="0"/>
+        </a:xfrm>
+      </p:grpSpPr>
+      <p:sp>
+        <p:nvSpPr>
+          <p:cNvPr id="3" name="Title 1">
+            <a:extLst>
+              <a:ext uri="{FF2B5EF4-FFF2-40B4-BE49-F238E27FC236}">
+                <a16:creationId xmlns:a16="http://schemas.microsoft.com/office/drawing/2014/main" id="{0538E887-D31E-DB45-74CF-DBCD3AB1770B}"/>
+              </a:ext>
+            </a:extLst>
+          </p:cNvPr>
+          <p:cNvSpPr txBox="1">
+            <a:spLocks/>
+          </p:cNvSpPr>
+          <p:nvPr/>
+        </p:nvSpPr>
+        <p:spPr>
+          <a:xfrm>
+            <a:off x="253199" y="396327"/>
+            <a:ext cx="6195935" cy="946280"/>
+          </a:xfrm>
+          <a:prstGeom prst="rect">
+            <a:avLst/>
+          </a:prstGeom>
+        </p:spPr>
+        <p:txBody>
+          <a:bodyPr>
+            <a:normAutofit/>
+          </a:bodyPr>
+          <a:lstStyle>
+            <a:lvl1pPr algn="l" defTabSz="914400" rtl="0" eaLnBrk="1" latinLnBrk="0" hangingPunct="1">
+              <a:lnSpc>
+                <a:spcPct val="85000"/>
+              </a:lnSpc>
+              <a:spcBef>
+                <a:spcPct val="0"/>
+              </a:spcBef>
+              <a:buNone/>
+              <a:defRPr sz="4800" kern="1200" spc="-50" baseline="0">
+                <a:solidFill>
+                  <a:schemeClr val="tx1">
+                    <a:lumMod val="75000"/>
+                    <a:lumOff val="25000"/>
+                  </a:schemeClr>
+                </a:solidFill>
+                <a:latin typeface="+mj-lt"/>
+                <a:ea typeface="+mj-ea"/>
+                <a:cs typeface="+mj-cs"/>
+              </a:defRPr>
+            </a:lvl1pPr>
+          </a:lstStyle>
+          <a:p>
+            <a:r>
+              <a:rPr lang="en-IN" sz="4000" dirty="0"/>
+              <a:t>Objectives! </a:t>
+            </a:r>
+          </a:p>
+        </p:txBody>
+      </p:sp>
+      <p:sp>
+        <p:nvSpPr>
+          <p:cNvPr id="4" name="Rectangle 3">
+            <a:extLst>
+              <a:ext uri="{FF2B5EF4-FFF2-40B4-BE49-F238E27FC236}">
+                <a16:creationId xmlns:a16="http://schemas.microsoft.com/office/drawing/2014/main" id="{F25169DF-100A-44DF-57C3-6F3E5CB5C7B7}"/>
+              </a:ext>
+            </a:extLst>
+          </p:cNvPr>
+          <p:cNvSpPr/>
+          <p:nvPr/>
+        </p:nvSpPr>
+        <p:spPr>
+          <a:xfrm>
+            <a:off x="658766" y="1407886"/>
+            <a:ext cx="2692400" cy="1320800"/>
+          </a:xfrm>
+          <a:prstGeom prst="rect">
+            <a:avLst/>
+          </a:prstGeom>
+        </p:spPr>
+        <p:style>
+          <a:lnRef idx="1">
+            <a:schemeClr val="accent1"/>
+          </a:lnRef>
+          <a:fillRef idx="2">
+            <a:schemeClr val="accent1"/>
+          </a:fillRef>
+          <a:effectRef idx="1">
+            <a:schemeClr val="accent1"/>
+          </a:effectRef>
+          <a:fontRef idx="minor">
+            <a:schemeClr val="dk1"/>
+          </a:fontRef>
+        </p:style>
+        <p:txBody>
+          <a:bodyPr rtlCol="0" anchor="ctr"/>
+          <a:lstStyle/>
+          <a:p>
+            <a:pPr algn="ctr"/>
+            <a:r>
+              <a:rPr lang="en-IN" dirty="0"/>
+              <a:t>Learn Basics of RTL-SDRs, </a:t>
+            </a:r>
+            <a:r>
+              <a:rPr lang="en-IN" dirty="0" err="1"/>
+              <a:t>Hackrf</a:t>
+            </a:r>
+            <a:r>
+              <a:rPr lang="en-IN" dirty="0"/>
+              <a:t> one, GNU Radio </a:t>
+            </a:r>
+            <a:r>
+              <a:rPr lang="en-IN" dirty="0" err="1"/>
+              <a:t>Campanion</a:t>
+            </a:r>
+            <a:endParaRPr lang="en-IN" dirty="0"/>
+          </a:p>
+        </p:txBody>
+      </p:sp>
+      <p:sp>
+        <p:nvSpPr>
+          <p:cNvPr id="5" name="Rectangle 4">
+            <a:extLst>
+              <a:ext uri="{FF2B5EF4-FFF2-40B4-BE49-F238E27FC236}">
+                <a16:creationId xmlns:a16="http://schemas.microsoft.com/office/drawing/2014/main" id="{85E379C5-E98E-76F2-14BD-53CD62C54D73}"/>
+              </a:ext>
+            </a:extLst>
+          </p:cNvPr>
+          <p:cNvSpPr/>
+          <p:nvPr/>
+        </p:nvSpPr>
+        <p:spPr>
+          <a:xfrm>
+            <a:off x="4341765" y="1407886"/>
+            <a:ext cx="2692400" cy="1320800"/>
+          </a:xfrm>
+          <a:prstGeom prst="rect">
+            <a:avLst/>
+          </a:prstGeom>
+        </p:spPr>
+        <p:style>
+          <a:lnRef idx="1">
+            <a:schemeClr val="accent1"/>
+          </a:lnRef>
+          <a:fillRef idx="2">
+            <a:schemeClr val="accent1"/>
+          </a:fillRef>
+          <a:effectRef idx="1">
+            <a:schemeClr val="accent1"/>
+          </a:effectRef>
+          <a:fontRef idx="minor">
+            <a:schemeClr val="dk1"/>
+          </a:fontRef>
+        </p:style>
+        <p:txBody>
+          <a:bodyPr rtlCol="0" anchor="ctr"/>
+          <a:lstStyle/>
+          <a:p>
+            <a:pPr algn="ctr"/>
+            <a:r>
+              <a:rPr lang="en-IN" dirty="0"/>
+              <a:t>Transmitter and Receiver Placement and circuit simulation</a:t>
+            </a:r>
+          </a:p>
+        </p:txBody>
+      </p:sp>
+      <p:sp>
+        <p:nvSpPr>
+          <p:cNvPr id="6" name="Rectangle 5">
+            <a:extLst>
+              <a:ext uri="{FF2B5EF4-FFF2-40B4-BE49-F238E27FC236}">
+                <a16:creationId xmlns:a16="http://schemas.microsoft.com/office/drawing/2014/main" id="{59E5A7B2-73DD-D150-B4F1-72DCCA480384}"/>
+              </a:ext>
+            </a:extLst>
+          </p:cNvPr>
+          <p:cNvSpPr/>
+          <p:nvPr/>
+        </p:nvSpPr>
+        <p:spPr>
+          <a:xfrm>
+            <a:off x="8024765" y="1407886"/>
+            <a:ext cx="2692400" cy="1320800"/>
+          </a:xfrm>
+          <a:prstGeom prst="rect">
+            <a:avLst/>
+          </a:prstGeom>
+        </p:spPr>
+        <p:style>
+          <a:lnRef idx="1">
+            <a:schemeClr val="accent1"/>
+          </a:lnRef>
+          <a:fillRef idx="2">
+            <a:schemeClr val="accent1"/>
+          </a:fillRef>
+          <a:effectRef idx="1">
+            <a:schemeClr val="accent1"/>
+          </a:effectRef>
+          <a:fontRef idx="minor">
+            <a:schemeClr val="dk1"/>
+          </a:fontRef>
+        </p:style>
+        <p:txBody>
+          <a:bodyPr rtlCol="0" anchor="ctr"/>
+          <a:lstStyle/>
+          <a:p>
+            <a:pPr algn="ctr"/>
+            <a:r>
+              <a:rPr lang="en-IN" dirty="0"/>
+              <a:t>Synchronization among receivers</a:t>
+            </a:r>
+          </a:p>
+        </p:txBody>
+      </p:sp>
+      <p:sp>
+        <p:nvSpPr>
+          <p:cNvPr id="7" name="Rectangle 6">
+            <a:extLst>
+              <a:ext uri="{FF2B5EF4-FFF2-40B4-BE49-F238E27FC236}">
+                <a16:creationId xmlns:a16="http://schemas.microsoft.com/office/drawing/2014/main" id="{44805BF3-6F75-A089-7C42-721C685EFBDA}"/>
+              </a:ext>
+            </a:extLst>
+          </p:cNvPr>
+          <p:cNvSpPr/>
+          <p:nvPr/>
+        </p:nvSpPr>
+        <p:spPr>
+          <a:xfrm>
+            <a:off x="6504035" y="3708401"/>
+            <a:ext cx="2692400" cy="1320800"/>
+          </a:xfrm>
+          <a:prstGeom prst="rect">
+            <a:avLst/>
+          </a:prstGeom>
+        </p:spPr>
+        <p:style>
+          <a:lnRef idx="1">
+            <a:schemeClr val="accent1"/>
+          </a:lnRef>
+          <a:fillRef idx="2">
+            <a:schemeClr val="accent1"/>
+          </a:fillRef>
+          <a:effectRef idx="1">
+            <a:schemeClr val="accent1"/>
+          </a:effectRef>
+          <a:fontRef idx="minor">
+            <a:schemeClr val="dk1"/>
+          </a:fontRef>
+        </p:style>
+        <p:txBody>
+          <a:bodyPr rtlCol="0" anchor="ctr"/>
+          <a:lstStyle/>
+          <a:p>
+            <a:pPr algn="ctr"/>
+            <a:r>
+              <a:rPr lang="en-IN" dirty="0"/>
+              <a:t>Data Handling and Cross Correlation</a:t>
+            </a:r>
+          </a:p>
+        </p:txBody>
+      </p:sp>
+      <p:sp>
+        <p:nvSpPr>
+          <p:cNvPr id="8" name="Rectangle 7">
+            <a:extLst>
+              <a:ext uri="{FF2B5EF4-FFF2-40B4-BE49-F238E27FC236}">
+                <a16:creationId xmlns:a16="http://schemas.microsoft.com/office/drawing/2014/main" id="{7DF8F190-5652-B20B-0201-DCF354386CC8}"/>
+              </a:ext>
+            </a:extLst>
+          </p:cNvPr>
+          <p:cNvSpPr/>
+          <p:nvPr/>
+        </p:nvSpPr>
+        <p:spPr>
+          <a:xfrm>
+            <a:off x="2473050" y="3708401"/>
+            <a:ext cx="2692400" cy="1320800"/>
+          </a:xfrm>
+          <a:prstGeom prst="rect">
+            <a:avLst/>
+          </a:prstGeom>
+        </p:spPr>
+        <p:style>
+          <a:lnRef idx="1">
+            <a:schemeClr val="accent1"/>
+          </a:lnRef>
+          <a:fillRef idx="2">
+            <a:schemeClr val="accent1"/>
+          </a:fillRef>
+          <a:effectRef idx="1">
+            <a:schemeClr val="accent1"/>
+          </a:effectRef>
+          <a:fontRef idx="minor">
+            <a:schemeClr val="dk1"/>
+          </a:fontRef>
+        </p:style>
+        <p:txBody>
+          <a:bodyPr rtlCol="0" anchor="ctr"/>
+          <a:lstStyle/>
+          <a:p>
+            <a:pPr algn="ctr"/>
+            <a:r>
+              <a:rPr lang="en-IN" dirty="0"/>
+              <a:t>TDOA Calculation and Position Estimation via Visualization</a:t>
+            </a:r>
+          </a:p>
+        </p:txBody>
+      </p:sp>
+      <p:sp>
+        <p:nvSpPr>
+          <p:cNvPr id="10" name="Arrow: Right 9">
+            <a:extLst>
+              <a:ext uri="{FF2B5EF4-FFF2-40B4-BE49-F238E27FC236}">
+                <a16:creationId xmlns:a16="http://schemas.microsoft.com/office/drawing/2014/main" id="{B493BD6E-6F7D-DE04-0861-947B04F80105}"/>
+              </a:ext>
+            </a:extLst>
+          </p:cNvPr>
+          <p:cNvSpPr/>
+          <p:nvPr/>
+        </p:nvSpPr>
+        <p:spPr>
+          <a:xfrm>
+            <a:off x="3351166" y="1857829"/>
+            <a:ext cx="990599" cy="312057"/>
+          </a:xfrm>
+          <a:prstGeom prst="rightArrow">
+            <a:avLst/>
+          </a:prstGeom>
+        </p:spPr>
+        <p:style>
+          <a:lnRef idx="2">
+            <a:schemeClr val="accent1">
+              <a:shade val="15000"/>
+            </a:schemeClr>
+          </a:lnRef>
+          <a:fillRef idx="1">
+            <a:schemeClr val="accent1"/>
+          </a:fillRef>
+          <a:effectRef idx="0">
+            <a:schemeClr val="accent1"/>
+          </a:effectRef>
+          <a:fontRef idx="minor">
+            <a:schemeClr val="lt1"/>
+          </a:fontRef>
+        </p:style>
+        <p:txBody>
+          <a:bodyPr rtlCol="0" anchor="ctr"/>
+          <a:lstStyle/>
+          <a:p>
+            <a:pPr algn="ctr"/>
+            <a:endParaRPr lang="en-IN"/>
+          </a:p>
+        </p:txBody>
+      </p:sp>
+      <p:sp>
+        <p:nvSpPr>
+          <p:cNvPr id="11" name="Arrow: Right 10">
+            <a:extLst>
+              <a:ext uri="{FF2B5EF4-FFF2-40B4-BE49-F238E27FC236}">
+                <a16:creationId xmlns:a16="http://schemas.microsoft.com/office/drawing/2014/main" id="{8E0185CB-E31B-EDAA-E947-737C1C1CC0D0}"/>
+              </a:ext>
+            </a:extLst>
+          </p:cNvPr>
+          <p:cNvSpPr/>
+          <p:nvPr/>
+        </p:nvSpPr>
+        <p:spPr>
+          <a:xfrm>
+            <a:off x="7034165" y="1912257"/>
+            <a:ext cx="990599" cy="312057"/>
+          </a:xfrm>
+          <a:prstGeom prst="rightArrow">
+            <a:avLst/>
+          </a:prstGeom>
+        </p:spPr>
+        <p:style>
+          <a:lnRef idx="2">
+            <a:schemeClr val="accent1">
+              <a:shade val="15000"/>
+            </a:schemeClr>
+          </a:lnRef>
+          <a:fillRef idx="1">
+            <a:schemeClr val="accent1"/>
+          </a:fillRef>
+          <a:effectRef idx="0">
+            <a:schemeClr val="accent1"/>
+          </a:effectRef>
+          <a:fontRef idx="minor">
+            <a:schemeClr val="lt1"/>
+          </a:fontRef>
+        </p:style>
+        <p:txBody>
+          <a:bodyPr rtlCol="0" anchor="ctr"/>
+          <a:lstStyle/>
+          <a:p>
+            <a:pPr algn="ctr"/>
+            <a:endParaRPr lang="en-IN"/>
+          </a:p>
+        </p:txBody>
+      </p:sp>
+      <p:sp>
+        <p:nvSpPr>
+          <p:cNvPr id="12" name="Arrow: Right 11">
+            <a:extLst>
+              <a:ext uri="{FF2B5EF4-FFF2-40B4-BE49-F238E27FC236}">
+                <a16:creationId xmlns:a16="http://schemas.microsoft.com/office/drawing/2014/main" id="{E25285CD-99E1-2293-2031-3DBF4CF2A80C}"/>
+              </a:ext>
+            </a:extLst>
+          </p:cNvPr>
+          <p:cNvSpPr/>
+          <p:nvPr/>
+        </p:nvSpPr>
+        <p:spPr>
+          <a:xfrm rot="5400000">
+            <a:off x="8197291" y="3037464"/>
+            <a:ext cx="970640" cy="371235"/>
+          </a:xfrm>
+          <a:prstGeom prst="rightArrow">
+            <a:avLst/>
+          </a:prstGeom>
+        </p:spPr>
+        <p:style>
+          <a:lnRef idx="2">
+            <a:schemeClr val="accent1">
+              <a:shade val="15000"/>
+            </a:schemeClr>
+          </a:lnRef>
+          <a:fillRef idx="1">
+            <a:schemeClr val="accent1"/>
+          </a:fillRef>
+          <a:effectRef idx="0">
+            <a:schemeClr val="accent1"/>
+          </a:effectRef>
+          <a:fontRef idx="minor">
+            <a:schemeClr val="lt1"/>
+          </a:fontRef>
+        </p:style>
+        <p:txBody>
+          <a:bodyPr rtlCol="0" anchor="ctr"/>
+          <a:lstStyle/>
+          <a:p>
+            <a:pPr algn="ctr"/>
+            <a:endParaRPr lang="en-IN"/>
+          </a:p>
+        </p:txBody>
+      </p:sp>
+      <p:sp>
+        <p:nvSpPr>
+          <p:cNvPr id="13" name="Arrow: Right 12">
+            <a:extLst>
+              <a:ext uri="{FF2B5EF4-FFF2-40B4-BE49-F238E27FC236}">
+                <a16:creationId xmlns:a16="http://schemas.microsoft.com/office/drawing/2014/main" id="{1225FA5C-60EE-9A80-1F44-23287C750F9A}"/>
+              </a:ext>
+            </a:extLst>
+          </p:cNvPr>
+          <p:cNvSpPr/>
+          <p:nvPr/>
+        </p:nvSpPr>
+        <p:spPr>
+          <a:xfrm rot="10800000">
+            <a:off x="5165450" y="4212772"/>
+            <a:ext cx="1338585" cy="371235"/>
+          </a:xfrm>
+          <a:prstGeom prst="rightArrow">
+            <a:avLst/>
+          </a:prstGeom>
+        </p:spPr>
+        <p:style>
+          <a:lnRef idx="2">
+            <a:schemeClr val="accent1">
+              <a:shade val="15000"/>
+            </a:schemeClr>
+          </a:lnRef>
+          <a:fillRef idx="1">
+            <a:schemeClr val="accent1"/>
+          </a:fillRef>
+          <a:effectRef idx="0">
+            <a:schemeClr val="accent1"/>
+          </a:effectRef>
+          <a:fontRef idx="minor">
+            <a:schemeClr val="lt1"/>
+          </a:fontRef>
+        </p:style>
+        <p:txBody>
+          <a:bodyPr rtlCol="0" anchor="ctr"/>
+          <a:lstStyle/>
+          <a:p>
+            <a:pPr algn="ctr"/>
+            <a:endParaRPr lang="en-IN"/>
+          </a:p>
+        </p:txBody>
+      </p:sp>
+    </p:spTree>
+    <p:extLst>
+      <p:ext uri="{BB962C8B-B14F-4D97-AF65-F5344CB8AC3E}">
+        <p14:creationId xmlns:p14="http://schemas.microsoft.com/office/powerpoint/2010/main" val="984036470"/>
       </p:ext>
     </p:extLst>
   </p:cSld>
@@ -6824,7 +8162,7 @@
                                           </p:stCondLst>
                                         </p:cTn>
                                         <p:tgtEl>
-                                          <p:spTgt spid="2"/>
+                                          <p:spTgt spid="10"/>
                                         </p:tgtEl>
                                         <p:attrNameLst>
                                           <p:attrName>style.visibility</p:attrName>
@@ -6838,7 +8176,306 @@
                                       <p:cBhvr>
                                         <p:cTn id="7" dur="500"/>
                                         <p:tgtEl>
-                                          <p:spTgt spid="2"/>
+                                          <p:spTgt spid="10"/>
+                                        </p:tgtEl>
+                                      </p:cBhvr>
+                                    </p:animEffect>
+                                  </p:childTnLst>
+                                </p:cTn>
+                              </p:par>
+                              <p:par>
+                                <p:cTn id="8" presetID="10" presetClass="entr" presetSubtype="0" fill="hold" grpId="0" nodeType="withEffect">
+                                  <p:stCondLst>
+                                    <p:cond delay="0"/>
+                                  </p:stCondLst>
+                                  <p:childTnLst>
+                                    <p:set>
+                                      <p:cBhvr>
+                                        <p:cTn id="9" dur="1" fill="hold">
+                                          <p:stCondLst>
+                                            <p:cond delay="0"/>
+                                          </p:stCondLst>
+                                        </p:cTn>
+                                        <p:tgtEl>
+                                          <p:spTgt spid="5"/>
+                                        </p:tgtEl>
+                                        <p:attrNameLst>
+                                          <p:attrName>style.visibility</p:attrName>
+                                        </p:attrNameLst>
+                                      </p:cBhvr>
+                                      <p:to>
+                                        <p:strVal val="visible"/>
+                                      </p:to>
+                                    </p:set>
+                                    <p:animEffect transition="in" filter="fade">
+                                      <p:cBhvr>
+                                        <p:cTn id="10" dur="500"/>
+                                        <p:tgtEl>
+                                          <p:spTgt spid="5"/>
+                                        </p:tgtEl>
+                                      </p:cBhvr>
+                                    </p:animEffect>
+                                  </p:childTnLst>
+                                </p:cTn>
+                              </p:par>
+                            </p:childTnLst>
+                          </p:cTn>
+                        </p:par>
+                      </p:childTnLst>
+                    </p:cTn>
+                  </p:par>
+                  <p:par>
+                    <p:cTn id="11" fill="hold">
+                      <p:stCondLst>
+                        <p:cond delay="indefinite"/>
+                      </p:stCondLst>
+                      <p:childTnLst>
+                        <p:par>
+                          <p:cTn id="12" fill="hold">
+                            <p:stCondLst>
+                              <p:cond delay="0"/>
+                            </p:stCondLst>
+                            <p:childTnLst>
+                              <p:par>
+                                <p:cTn id="13" presetID="10" presetClass="entr" presetSubtype="0" fill="hold" grpId="0" nodeType="clickEffect">
+                                  <p:stCondLst>
+                                    <p:cond delay="0"/>
+                                  </p:stCondLst>
+                                  <p:childTnLst>
+                                    <p:set>
+                                      <p:cBhvr>
+                                        <p:cTn id="14" dur="1" fill="hold">
+                                          <p:stCondLst>
+                                            <p:cond delay="0"/>
+                                          </p:stCondLst>
+                                        </p:cTn>
+                                        <p:tgtEl>
+                                          <p:spTgt spid="11"/>
+                                        </p:tgtEl>
+                                        <p:attrNameLst>
+                                          <p:attrName>style.visibility</p:attrName>
+                                        </p:attrNameLst>
+                                      </p:cBhvr>
+                                      <p:to>
+                                        <p:strVal val="visible"/>
+                                      </p:to>
+                                    </p:set>
+                                    <p:animEffect transition="in" filter="fade">
+                                      <p:cBhvr>
+                                        <p:cTn id="15" dur="500"/>
+                                        <p:tgtEl>
+                                          <p:spTgt spid="11"/>
+                                        </p:tgtEl>
+                                      </p:cBhvr>
+                                    </p:animEffect>
+                                  </p:childTnLst>
+                                </p:cTn>
+                              </p:par>
+                              <p:par>
+                                <p:cTn id="16" presetID="10" presetClass="entr" presetSubtype="0" fill="hold" grpId="0" nodeType="withEffect">
+                                  <p:stCondLst>
+                                    <p:cond delay="0"/>
+                                  </p:stCondLst>
+                                  <p:childTnLst>
+                                    <p:set>
+                                      <p:cBhvr>
+                                        <p:cTn id="17" dur="1" fill="hold">
+                                          <p:stCondLst>
+                                            <p:cond delay="0"/>
+                                          </p:stCondLst>
+                                        </p:cTn>
+                                        <p:tgtEl>
+                                          <p:spTgt spid="6"/>
+                                        </p:tgtEl>
+                                        <p:attrNameLst>
+                                          <p:attrName>style.visibility</p:attrName>
+                                        </p:attrNameLst>
+                                      </p:cBhvr>
+                                      <p:to>
+                                        <p:strVal val="visible"/>
+                                      </p:to>
+                                    </p:set>
+                                    <p:animEffect transition="in" filter="fade">
+                                      <p:cBhvr>
+                                        <p:cTn id="18" dur="500"/>
+                                        <p:tgtEl>
+                                          <p:spTgt spid="6"/>
+                                        </p:tgtEl>
+                                      </p:cBhvr>
+                                    </p:animEffect>
+                                  </p:childTnLst>
+                                </p:cTn>
+                              </p:par>
+                            </p:childTnLst>
+                          </p:cTn>
+                        </p:par>
+                      </p:childTnLst>
+                    </p:cTn>
+                  </p:par>
+                  <p:par>
+                    <p:cTn id="19" fill="hold">
+                      <p:stCondLst>
+                        <p:cond delay="indefinite"/>
+                      </p:stCondLst>
+                      <p:childTnLst>
+                        <p:par>
+                          <p:cTn id="20" fill="hold">
+                            <p:stCondLst>
+                              <p:cond delay="0"/>
+                            </p:stCondLst>
+                            <p:childTnLst>
+                              <p:par>
+                                <p:cTn id="21" presetID="10" presetClass="entr" presetSubtype="0" fill="hold" grpId="0" nodeType="clickEffect">
+                                  <p:stCondLst>
+                                    <p:cond delay="0"/>
+                                  </p:stCondLst>
+                                  <p:childTnLst>
+                                    <p:set>
+                                      <p:cBhvr>
+                                        <p:cTn id="22" dur="1" fill="hold">
+                                          <p:stCondLst>
+                                            <p:cond delay="0"/>
+                                          </p:stCondLst>
+                                        </p:cTn>
+                                        <p:tgtEl>
+                                          <p:spTgt spid="12"/>
+                                        </p:tgtEl>
+                                        <p:attrNameLst>
+                                          <p:attrName>style.visibility</p:attrName>
+                                        </p:attrNameLst>
+                                      </p:cBhvr>
+                                      <p:to>
+                                        <p:strVal val="visible"/>
+                                      </p:to>
+                                    </p:set>
+                                    <p:animEffect transition="in" filter="fade">
+                                      <p:cBhvr>
+                                        <p:cTn id="23" dur="500"/>
+                                        <p:tgtEl>
+                                          <p:spTgt spid="12"/>
+                                        </p:tgtEl>
+                                      </p:cBhvr>
+                                    </p:animEffect>
+                                  </p:childTnLst>
+                                </p:cTn>
+                              </p:par>
+                              <p:par>
+                                <p:cTn id="24" presetID="10" presetClass="entr" presetSubtype="0" fill="hold" grpId="0" nodeType="withEffect">
+                                  <p:stCondLst>
+                                    <p:cond delay="0"/>
+                                  </p:stCondLst>
+                                  <p:childTnLst>
+                                    <p:set>
+                                      <p:cBhvr>
+                                        <p:cTn id="25" dur="1" fill="hold">
+                                          <p:stCondLst>
+                                            <p:cond delay="0"/>
+                                          </p:stCondLst>
+                                        </p:cTn>
+                                        <p:tgtEl>
+                                          <p:spTgt spid="7"/>
+                                        </p:tgtEl>
+                                        <p:attrNameLst>
+                                          <p:attrName>style.visibility</p:attrName>
+                                        </p:attrNameLst>
+                                      </p:cBhvr>
+                                      <p:to>
+                                        <p:strVal val="visible"/>
+                                      </p:to>
+                                    </p:set>
+                                    <p:animEffect transition="in" filter="fade">
+                                      <p:cBhvr>
+                                        <p:cTn id="26" dur="500"/>
+                                        <p:tgtEl>
+                                          <p:spTgt spid="7"/>
+                                        </p:tgtEl>
+                                      </p:cBhvr>
+                                    </p:animEffect>
+                                  </p:childTnLst>
+                                </p:cTn>
+                              </p:par>
+                            </p:childTnLst>
+                          </p:cTn>
+                        </p:par>
+                      </p:childTnLst>
+                    </p:cTn>
+                  </p:par>
+                  <p:par>
+                    <p:cTn id="27" fill="hold">
+                      <p:stCondLst>
+                        <p:cond delay="indefinite"/>
+                      </p:stCondLst>
+                      <p:childTnLst>
+                        <p:par>
+                          <p:cTn id="28" fill="hold">
+                            <p:stCondLst>
+                              <p:cond delay="0"/>
+                            </p:stCondLst>
+                            <p:childTnLst>
+                              <p:par>
+                                <p:cTn id="29" presetID="10" presetClass="entr" presetSubtype="0" fill="hold" grpId="0" nodeType="clickEffect">
+                                  <p:stCondLst>
+                                    <p:cond delay="0"/>
+                                  </p:stCondLst>
+                                  <p:childTnLst>
+                                    <p:set>
+                                      <p:cBhvr>
+                                        <p:cTn id="30" dur="1" fill="hold">
+                                          <p:stCondLst>
+                                            <p:cond delay="0"/>
+                                          </p:stCondLst>
+                                        </p:cTn>
+                                        <p:tgtEl>
+                                          <p:spTgt spid="13"/>
+                                        </p:tgtEl>
+                                        <p:attrNameLst>
+                                          <p:attrName>style.visibility</p:attrName>
+                                        </p:attrNameLst>
+                                      </p:cBhvr>
+                                      <p:to>
+                                        <p:strVal val="visible"/>
+                                      </p:to>
+                                    </p:set>
+                                    <p:animEffect transition="in" filter="fade">
+                                      <p:cBhvr>
+                                        <p:cTn id="31" dur="500"/>
+                                        <p:tgtEl>
+                                          <p:spTgt spid="13"/>
+                                        </p:tgtEl>
+                                      </p:cBhvr>
+                                    </p:animEffect>
+                                  </p:childTnLst>
+                                </p:cTn>
+                              </p:par>
+                              <p:par>
+                                <p:cTn id="32" presetID="10" presetClass="entr" presetSubtype="0" fill="hold" grpId="0" nodeType="withEffect">
+                                  <p:stCondLst>
+                                    <p:cond delay="0"/>
+                                  </p:stCondLst>
+                                  <p:childTnLst>
+                                    <p:set>
+                                      <p:cBhvr>
+                                        <p:cTn id="33" dur="1" fill="hold">
+                                          <p:stCondLst>
+                                            <p:cond delay="0"/>
+                                          </p:stCondLst>
+                                        </p:cTn>
+                                        <p:tgtEl>
+                                          <p:spTgt spid="8"/>
+                                        </p:tgtEl>
+                                        <p:attrNameLst>
+                                          <p:attrName>style.visibility</p:attrName>
+                                        </p:attrNameLst>
+                                      </p:cBhvr>
+                                      <p:to>
+                                        <p:strVal val="visible"/>
+                                      </p:to>
+                                    </p:set>
+                                    <p:animEffect transition="in" filter="fade">
+                                      <p:cBhvr>
+                                        <p:cTn id="34" dur="500"/>
+                                        <p:tgtEl>
+                                          <p:spTgt spid="8"/>
                                         </p:tgtEl>
                                       </p:cBhvr>
                                     </p:animEffect>
@@ -6873,9 +8510,46 @@
       </p:par>
     </p:tnLst>
     <p:bldLst>
-      <p:bldP spid="2" grpId="0"/>
+      <p:bldP spid="5" grpId="0" animBg="1"/>
+      <p:bldP spid="6" grpId="0" animBg="1"/>
+      <p:bldP spid="7" grpId="0" animBg="1"/>
+      <p:bldP spid="8" grpId="0" animBg="1"/>
+      <p:bldP spid="10" grpId="0" animBg="1"/>
+      <p:bldP spid="11" grpId="0" animBg="1"/>
+      <p:bldP spid="12" grpId="0" animBg="1"/>
+      <p:bldP spid="13" grpId="0" animBg="1"/>
     </p:bldLst>
   </p:timing>
+</p:sld>
+</file>
+
+<file path=ppt/slides/slide6.xml><?xml version="1.0" encoding="utf-8"?>
+<p:sld xmlns:a="http://schemas.openxmlformats.org/drawingml/2006/main" xmlns:r="http://schemas.openxmlformats.org/officeDocument/2006/relationships" xmlns:p="http://schemas.openxmlformats.org/presentationml/2006/main">
+  <p:cSld>
+    <p:spTree>
+      <p:nvGrpSpPr>
+        <p:cNvPr id="1" name=""/>
+        <p:cNvGrpSpPr/>
+        <p:nvPr/>
+      </p:nvGrpSpPr>
+      <p:grpSpPr>
+        <a:xfrm>
+          <a:off x="0" y="0"/>
+          <a:ext cx="0" cy="0"/>
+          <a:chOff x="0" y="0"/>
+          <a:chExt cx="0" cy="0"/>
+        </a:xfrm>
+      </p:grpSpPr>
+    </p:spTree>
+    <p:extLst>
+      <p:ext uri="{BB962C8B-B14F-4D97-AF65-F5344CB8AC3E}">
+        <p14:creationId xmlns:p14="http://schemas.microsoft.com/office/powerpoint/2010/main" val="2310423676"/>
+      </p:ext>
+    </p:extLst>
+  </p:cSld>
+  <p:clrMapOvr>
+    <a:masterClrMapping/>
+  </p:clrMapOvr>
 </p:sld>
 </file>
 

</xml_diff>